<commit_message>
ICEM makale ve PEMD sunumda güncellemeler.
</commit_message>
<xml_diff>
--- a/Paper/PEMD 2018/Presentation/PEMD2018_OralPres_Mesut_Uğur.pptx
+++ b/Paper/PEMD 2018/Presentation/PEMD2018_OralPres_Mesut_Uğur.pptx
@@ -222,7 +222,7 @@
           <a:p>
             <a:fld id="{D1C008C1-D970-43BD-9678-58985B84B3B0}" type="datetimeFigureOut">
               <a:rPr lang="tr-TR" smtClean="0"/>
-              <a:t>25.03.2018</a:t>
+              <a:t>26.03.2018</a:t>
             </a:fld>
             <a:endParaRPr lang="tr-TR"/>
           </a:p>
@@ -1847,7 +1847,7 @@
           <a:p>
             <a:fld id="{D275723C-A363-4114-BE18-3E9589C2B9C2}" type="datetime1">
               <a:rPr lang="en-US" smtClean="0"/>
-              <a:t>3/25/2018</a:t>
+              <a:t>3/26/2018</a:t>
             </a:fld>
             <a:endParaRPr lang="en-US" dirty="0"/>
           </a:p>
@@ -2018,7 +2018,7 @@
           <a:p>
             <a:fld id="{C5592633-93A2-4DB7-B3D8-5F6714E7EFEC}" type="datetime1">
               <a:rPr lang="en-US" smtClean="0"/>
-              <a:t>3/25/2018</a:t>
+              <a:t>3/26/2018</a:t>
             </a:fld>
             <a:endParaRPr lang="en-US" dirty="0"/>
           </a:p>
@@ -2199,7 +2199,7 @@
           <a:p>
             <a:fld id="{6F760D8D-AE05-4AF5-8666-75C48EA7B609}" type="datetime1">
               <a:rPr lang="en-US" smtClean="0"/>
-              <a:t>3/25/2018</a:t>
+              <a:t>3/26/2018</a:t>
             </a:fld>
             <a:endParaRPr lang="en-US" dirty="0"/>
           </a:p>
@@ -2370,7 +2370,7 @@
           <a:p>
             <a:fld id="{6D87B8C0-62AE-47C8-A8EF-FC863B0F06E5}" type="datetime1">
               <a:rPr lang="en-US" smtClean="0"/>
-              <a:t>3/25/2018</a:t>
+              <a:t>3/26/2018</a:t>
             </a:fld>
             <a:endParaRPr lang="en-US" dirty="0"/>
           </a:p>
@@ -2617,7 +2617,7 @@
           <a:p>
             <a:fld id="{A76C8472-C309-40FA-8240-FF6234B7F0D0}" type="datetime1">
               <a:rPr lang="en-US" smtClean="0"/>
-              <a:t>3/25/2018</a:t>
+              <a:t>3/26/2018</a:t>
             </a:fld>
             <a:endParaRPr lang="en-US" dirty="0"/>
           </a:p>
@@ -2906,7 +2906,7 @@
           <a:p>
             <a:fld id="{33196F6B-6F2E-418E-A1A6-2F06576F6EF7}" type="datetime1">
               <a:rPr lang="en-US" smtClean="0"/>
-              <a:t>3/25/2018</a:t>
+              <a:t>3/26/2018</a:t>
             </a:fld>
             <a:endParaRPr lang="en-US" dirty="0"/>
           </a:p>
@@ -3329,7 +3329,7 @@
           <a:p>
             <a:fld id="{D09CD6EC-2E00-46F1-9BD2-E1865A200410}" type="datetime1">
               <a:rPr lang="en-US" smtClean="0"/>
-              <a:t>3/25/2018</a:t>
+              <a:t>3/26/2018</a:t>
             </a:fld>
             <a:endParaRPr lang="en-US" dirty="0"/>
           </a:p>
@@ -3448,7 +3448,7 @@
           <a:p>
             <a:fld id="{C40B9E5A-6330-4749-ACDB-FB892FCFE6A5}" type="datetime1">
               <a:rPr lang="en-US" smtClean="0"/>
-              <a:t>3/25/2018</a:t>
+              <a:t>3/26/2018</a:t>
             </a:fld>
             <a:endParaRPr lang="en-US" dirty="0"/>
           </a:p>
@@ -3544,7 +3544,7 @@
           <a:p>
             <a:fld id="{1C181CB3-A768-4AD8-A97F-12E47CC1200D}" type="datetime1">
               <a:rPr lang="en-US" smtClean="0"/>
-              <a:t>3/25/2018</a:t>
+              <a:t>3/26/2018</a:t>
             </a:fld>
             <a:endParaRPr lang="en-US" dirty="0"/>
           </a:p>
@@ -3822,7 +3822,7 @@
           <a:p>
             <a:fld id="{AF3D8106-484C-46C6-8BE9-348BFA7F2DCB}" type="datetime1">
               <a:rPr lang="en-US" smtClean="0"/>
-              <a:t>3/25/2018</a:t>
+              <a:t>3/26/2018</a:t>
             </a:fld>
             <a:endParaRPr lang="en-US" dirty="0"/>
           </a:p>
@@ -4076,7 +4076,7 @@
           <a:p>
             <a:fld id="{F2A57B0D-110E-4AAD-9411-DA6CB39E8776}" type="datetime1">
               <a:rPr lang="en-US" smtClean="0"/>
-              <a:t>3/25/2018</a:t>
+              <a:t>3/26/2018</a:t>
             </a:fld>
             <a:endParaRPr lang="en-US" dirty="0"/>
           </a:p>
@@ -4309,7 +4309,7 @@
           <a:p>
             <a:fld id="{FB4B5B0E-55D6-4DAA-879D-58BBFFC7379B}" type="datetime1">
               <a:rPr lang="en-US" smtClean="0"/>
-              <a:t>3/25/2018</a:t>
+              <a:t>3/26/2018</a:t>
             </a:fld>
             <a:endParaRPr lang="en-US" dirty="0"/>
           </a:p>
@@ -4819,18 +4819,47 @@
                 <a:latin typeface="Times New Roman" panose="02020603050405020304" pitchFamily="18" charset="0"/>
                 <a:cs typeface="Times New Roman" panose="02020603050405020304" pitchFamily="18" charset="0"/>
               </a:rPr>
-              <a:t>Department of Electrical and Electronics Engineering</a:t>
-            </a:r>
-          </a:p>
-          <a:p>
-            <a:pPr algn="ctr"/>
+              <a:t>Middle </a:t>
+            </a:r>
             <a:r>
               <a:rPr lang="en-US" sz="2000" i="1" dirty="0" smtClean="0">
                 <a:latin typeface="Times New Roman" panose="02020603050405020304" pitchFamily="18" charset="0"/>
                 <a:cs typeface="Times New Roman" panose="02020603050405020304" pitchFamily="18" charset="0"/>
               </a:rPr>
-              <a:t>Middle East Technical University</a:t>
-            </a:r>
+              <a:t>East Technical </a:t>
+            </a:r>
+            <a:r>
+              <a:rPr lang="en-US" sz="2000" i="1" dirty="0" smtClean="0">
+                <a:latin typeface="Times New Roman" panose="02020603050405020304" pitchFamily="18" charset="0"/>
+                <a:cs typeface="Times New Roman" panose="02020603050405020304" pitchFamily="18" charset="0"/>
+              </a:rPr>
+              <a:t>University</a:t>
+            </a:r>
+            <a:endParaRPr lang="tr-TR" sz="2000" i="1" dirty="0" smtClean="0">
+              <a:latin typeface="Times New Roman" panose="02020603050405020304" pitchFamily="18" charset="0"/>
+              <a:cs typeface="Times New Roman" panose="02020603050405020304" pitchFamily="18" charset="0"/>
+            </a:endParaRPr>
+          </a:p>
+          <a:p>
+            <a:pPr algn="ctr"/>
+            <a:r>
+              <a:rPr lang="tr-TR" sz="2000" i="1" dirty="0" smtClean="0">
+                <a:latin typeface="Times New Roman" panose="02020603050405020304" pitchFamily="18" charset="0"/>
+                <a:cs typeface="Times New Roman" panose="02020603050405020304" pitchFamily="18" charset="0"/>
+              </a:rPr>
+              <a:t>Ankara, </a:t>
+            </a:r>
+            <a:r>
+              <a:rPr lang="tr-TR" sz="2000" i="1" dirty="0" err="1" smtClean="0">
+                <a:latin typeface="Times New Roman" panose="02020603050405020304" pitchFamily="18" charset="0"/>
+                <a:cs typeface="Times New Roman" panose="02020603050405020304" pitchFamily="18" charset="0"/>
+              </a:rPr>
+              <a:t>Turkey</a:t>
+            </a:r>
+            <a:endParaRPr lang="en-US" sz="2000" i="1" dirty="0" smtClean="0">
+              <a:latin typeface="Times New Roman" panose="02020603050405020304" pitchFamily="18" charset="0"/>
+              <a:cs typeface="Times New Roman" panose="02020603050405020304" pitchFamily="18" charset="0"/>
+            </a:endParaRPr>
           </a:p>
         </p:txBody>
       </p:sp>
@@ -7782,7 +7811,7 @@
           <a:graphicData uri="http://schemas.openxmlformats.org/presentationml/2006/ole">
             <mc:AlternateContent xmlns:mc="http://schemas.openxmlformats.org/markup-compatibility/2006">
               <mc:Choice xmlns:v="urn:schemas-microsoft-com:vml" Requires="v">
-                <p:oleObj spid="_x0000_s5125" name="Visio" r:id="rId6" imgW="2485904" imgH="1866757" progId="Visio.Drawing.15">
+                <p:oleObj spid="_x0000_s5128" name="Visio" r:id="rId6" imgW="2485904" imgH="1866757" progId="Visio.Drawing.15">
                   <p:embed/>
                 </p:oleObj>
               </mc:Choice>
@@ -8296,15 +8325,7 @@
                 <a:ea typeface="Times New Roman" panose="02020603050405020304" pitchFamily="18" charset="0"/>
                 <a:cs typeface="Helvetica" panose="020B0604020202020204" pitchFamily="34" charset="0"/>
               </a:rPr>
-              <a:t>: 0.71 </a:t>
-            </a:r>
-            <a:r>
-              <a:rPr lang="tr-TR" dirty="0" smtClean="0">
-                <a:latin typeface="Hevletica"/>
-                <a:ea typeface="Times New Roman" panose="02020603050405020304" pitchFamily="18" charset="0"/>
-                <a:cs typeface="Helvetica" panose="020B0604020202020204" pitchFamily="34" charset="0"/>
-              </a:rPr>
-              <a:t>kW/</a:t>
+              <a:t>: 0.71 kW/</a:t>
             </a:r>
             <a:r>
               <a:rPr lang="tr-TR" dirty="0" err="1" smtClean="0">
@@ -9225,11 +9246,6 @@
               </a:rPr>
               <a:t>a</a:t>
             </a:r>
-            <a:endParaRPr lang="tr-TR" dirty="0" smtClean="0">
-              <a:latin typeface="Hevletica"/>
-              <a:ea typeface="Times New Roman" panose="02020603050405020304" pitchFamily="18" charset="0"/>
-              <a:cs typeface="Helvetica" panose="020B0604020202020204" pitchFamily="34" charset="0"/>
-            </a:endParaRPr>
           </a:p>
           <a:p>
             <a:pPr marL="285750" indent="-285750" algn="just">
@@ -9261,11 +9277,6 @@
               </a:rPr>
               <a:t>b</a:t>
             </a:r>
-            <a:endParaRPr lang="tr-TR" dirty="0" smtClean="0">
-              <a:latin typeface="Hevletica"/>
-              <a:ea typeface="Times New Roman" panose="02020603050405020304" pitchFamily="18" charset="0"/>
-              <a:cs typeface="Helvetica" panose="020B0604020202020204" pitchFamily="34" charset="0"/>
-            </a:endParaRPr>
           </a:p>
           <a:p>
             <a:pPr marL="285750" indent="-285750" algn="just">
@@ -9289,14 +9300,6 @@
               <a:buFont typeface="Wingdings" panose="05000000000000000000" pitchFamily="2" charset="2"/>
               <a:buChar char="ü"/>
             </a:pPr>
-            <a:r>
-              <a:rPr lang="tr-TR" dirty="0" smtClean="0">
-                <a:latin typeface="Hevletica"/>
-                <a:ea typeface="Times New Roman" panose="02020603050405020304" pitchFamily="18" charset="0"/>
-                <a:cs typeface="Helvetica" panose="020B0604020202020204" pitchFamily="34" charset="0"/>
-              </a:rPr>
-              <a:t>c</a:t>
-            </a:r>
             <a:endParaRPr lang="tr-TR" dirty="0" smtClean="0">
               <a:latin typeface="Hevletica"/>
               <a:ea typeface="Times New Roman" panose="02020603050405020304" pitchFamily="18" charset="0"/>
@@ -9401,55 +9404,6 @@
                                           <p:spTgt spid="24">
                                             <p:txEl>
                                               <p:pRg st="2" end="2"/>
-                                            </p:txEl>
-                                          </p:spTgt>
-                                        </p:tgtEl>
-                                        <p:attrNameLst>
-                                          <p:attrName>style.visibility</p:attrName>
-                                        </p:attrNameLst>
-                                      </p:cBhvr>
-                                      <p:to>
-                                        <p:strVal val="visible"/>
-                                      </p:to>
-                                    </p:set>
-                                  </p:childTnLst>
-                                </p:cTn>
-                              </p:par>
-                            </p:childTnLst>
-                          </p:cTn>
-                        </p:par>
-                      </p:childTnLst>
-                    </p:cTn>
-                  </p:par>
-                  <p:par>
-                    <p:cTn id="11" fill="hold">
-                      <p:stCondLst>
-                        <p:cond delay="indefinite"/>
-                      </p:stCondLst>
-                      <p:childTnLst>
-                        <p:par>
-                          <p:cTn id="12" fill="hold">
-                            <p:stCondLst>
-                              <p:cond delay="0"/>
-                            </p:stCondLst>
-                            <p:childTnLst>
-                              <p:par>
-                                <p:cTn id="13" presetID="1" presetClass="entr" presetSubtype="0" fill="hold" nodeType="clickEffect">
-                                  <p:stCondLst>
-                                    <p:cond delay="0"/>
-                                  </p:stCondLst>
-                                  <p:childTnLst>
-                                    <p:set>
-                                      <p:cBhvr>
-                                        <p:cTn id="14" dur="1" fill="hold">
-                                          <p:stCondLst>
-                                            <p:cond delay="0"/>
-                                          </p:stCondLst>
-                                        </p:cTn>
-                                        <p:tgtEl>
-                                          <p:spTgt spid="24">
-                                            <p:txEl>
-                                              <p:pRg st="4" end="4"/>
                                             </p:txEl>
                                           </p:spTgt>
                                         </p:tgtEl>
@@ -11641,14 +11595,7 @@
                 <a:latin typeface="Times New Roman" panose="02020603050405020304" pitchFamily="18" charset="0"/>
                 <a:cs typeface="Times New Roman" panose="02020603050405020304" pitchFamily="18" charset="0"/>
               </a:rPr>
-              <a:t> </a:t>
-            </a:r>
-            <a:r>
-              <a:rPr lang="tr-TR" sz="2400" dirty="0" smtClean="0">
-                <a:latin typeface="Times New Roman" panose="02020603050405020304" pitchFamily="18" charset="0"/>
-                <a:cs typeface="Times New Roman" panose="02020603050405020304" pitchFamily="18" charset="0"/>
-              </a:rPr>
-              <a:t>model (3’)</a:t>
+              <a:t> model (3’)</a:t>
             </a:r>
             <a:endParaRPr lang="en-US" sz="2400" dirty="0" smtClean="0">
               <a:latin typeface="Times New Roman" panose="02020603050405020304" pitchFamily="18" charset="0"/>
@@ -11793,10 +11740,6 @@
               </a:rPr>
               <a:t>References</a:t>
             </a:r>
-            <a:endParaRPr lang="en-US" sz="2400" dirty="0" smtClean="0">
-              <a:latin typeface="Times New Roman" panose="02020603050405020304" pitchFamily="18" charset="0"/>
-              <a:cs typeface="Times New Roman" panose="02020603050405020304" pitchFamily="18" charset="0"/>
-            </a:endParaRPr>
           </a:p>
         </p:txBody>
       </p:sp>
@@ -12166,7 +12109,7 @@
           <p:cNvPicPr/>
           <p:nvPr/>
         </p:nvPicPr>
-        <p:blipFill>
+        <p:blipFill rotWithShape="1">
           <a:blip r:embed="rId5">
             <a:extLst>
               <a:ext uri="{28A0092B-C50C-407E-A947-70E740481C1C}">
@@ -12174,15 +12117,13 @@
               </a:ext>
             </a:extLst>
           </a:blip>
-          <a:srcRect/>
-          <a:stretch>
-            <a:fillRect/>
-          </a:stretch>
+          <a:srcRect l="1340" r="-1"/>
+          <a:stretch/>
         </p:blipFill>
         <p:spPr bwMode="auto">
           <a:xfrm>
-            <a:off x="2288685" y="1439170"/>
-            <a:ext cx="5484681" cy="2895600"/>
+            <a:off x="2362199" y="1439170"/>
+            <a:ext cx="5411167" cy="2895600"/>
           </a:xfrm>
           <a:prstGeom prst="rect">
             <a:avLst/>
@@ -13562,20 +13503,7 @@
                 <a:latin typeface="Helvetica" panose="020B0604020202020204" pitchFamily="34" charset="0"/>
                 <a:cs typeface="Helvetica" panose="020B0604020202020204" pitchFamily="34" charset="0"/>
               </a:rPr>
-              <a:t>v</a:t>
-            </a:r>
-            <a:r>
-              <a:rPr lang="tr-TR" dirty="0" err="1" smtClean="0">
-                <a:solidFill>
-                  <a:schemeClr val="tx1">
-                    <a:lumMod val="95000"/>
-                    <a:lumOff val="5000"/>
-                  </a:schemeClr>
-                </a:solidFill>
-                <a:latin typeface="Helvetica" panose="020B0604020202020204" pitchFamily="34" charset="0"/>
-                <a:cs typeface="Helvetica" panose="020B0604020202020204" pitchFamily="34" charset="0"/>
-              </a:rPr>
-              <a:t>ibration</a:t>
+              <a:t>vibration</a:t>
             </a:r>
             <a:r>
               <a:rPr lang="tr-TR" dirty="0" smtClean="0">
@@ -14803,7 +14731,7 @@
           <a:graphicData uri="http://schemas.openxmlformats.org/presentationml/2006/ole">
             <mc:AlternateContent xmlns:mc="http://schemas.openxmlformats.org/markup-compatibility/2006">
               <mc:Choice xmlns:v="urn:schemas-microsoft-com:vml" Requires="v">
-                <p:oleObj spid="_x0000_s1068" name="Visio" r:id="rId7" imgW="2485904" imgH="1866757" progId="Visio.Drawing.15">
+                <p:oleObj spid="_x0000_s1071" name="Visio" r:id="rId7" imgW="2485904" imgH="1866757" progId="Visio.Drawing.15">
                   <p:embed/>
                 </p:oleObj>
               </mc:Choice>
@@ -21367,8 +21295,8 @@
           </a:p>
         </p:txBody>
       </p:sp>
-      <mc:AlternateContent xmlns:mc="http://schemas.openxmlformats.org/markup-compatibility/2006">
-        <mc:Choice xmlns:a14="http://schemas.microsoft.com/office/drawing/2010/main" Requires="a14">
+      <mc:AlternateContent xmlns:mc="http://schemas.openxmlformats.org/markup-compatibility/2006" xmlns:a14="http://schemas.microsoft.com/office/drawing/2010/main">
+        <mc:Choice Requires="a14">
           <p:sp>
             <p:nvSpPr>
               <p:cNvPr id="5" name="TextBox 4"/>
@@ -21391,6 +21319,7 @@
               </a:bodyPr>
               <a:lstStyle/>
               <a:p>
+                <a:pPr/>
                 <a14:m>
                   <m:oMathPara xmlns:m="http://schemas.openxmlformats.org/officeDocument/2006/math">
                     <m:oMathParaPr>
@@ -21470,7 +21399,7 @@
             </p:txBody>
           </p:sp>
         </mc:Choice>
-        <mc:Fallback>
+        <mc:Fallback xmlns="">
           <p:sp>
             <p:nvSpPr>
               <p:cNvPr id="5" name="TextBox 4"/>
@@ -21509,8 +21438,8 @@
           </p:sp>
         </mc:Fallback>
       </mc:AlternateContent>
-      <mc:AlternateContent xmlns:mc="http://schemas.openxmlformats.org/markup-compatibility/2006">
-        <mc:Choice xmlns:a14="http://schemas.microsoft.com/office/drawing/2010/main" Requires="a14">
+      <mc:AlternateContent xmlns:mc="http://schemas.openxmlformats.org/markup-compatibility/2006" xmlns:a14="http://schemas.microsoft.com/office/drawing/2010/main">
+        <mc:Choice Requires="a14">
           <p:sp>
             <p:nvSpPr>
               <p:cNvPr id="32" name="TextBox 31"/>
@@ -21533,6 +21462,7 @@
               </a:bodyPr>
               <a:lstStyle/>
               <a:p>
+                <a:pPr/>
                 <a14:m>
                   <m:oMathPara xmlns:m="http://schemas.openxmlformats.org/officeDocument/2006/math">
                     <m:oMathParaPr>
@@ -21750,7 +21680,7 @@
             </p:txBody>
           </p:sp>
         </mc:Choice>
-        <mc:Fallback>
+        <mc:Fallback xmlns="">
           <p:sp>
             <p:nvSpPr>
               <p:cNvPr id="32" name="TextBox 31"/>
@@ -22513,14 +22443,7 @@
                 <a:latin typeface="Times New Roman" panose="02020603050405020304" pitchFamily="18" charset="0"/>
                 <a:cs typeface="Times New Roman" panose="02020603050405020304" pitchFamily="18" charset="0"/>
               </a:rPr>
-              <a:t> </a:t>
-            </a:r>
-            <a:r>
-              <a:rPr lang="tr-TR" sz="3000" dirty="0" smtClean="0">
-                <a:latin typeface="Times New Roman" panose="02020603050405020304" pitchFamily="18" charset="0"/>
-                <a:cs typeface="Times New Roman" panose="02020603050405020304" pitchFamily="18" charset="0"/>
-              </a:rPr>
-              <a:t>Evaluation</a:t>
+              <a:t> Evaluation</a:t>
             </a:r>
             <a:endParaRPr lang="en-US" sz="3000" dirty="0">
               <a:latin typeface="Times New Roman" panose="02020603050405020304" pitchFamily="18" charset="0"/>
@@ -24247,14 +24170,7 @@
                 <a:latin typeface="Times New Roman" panose="02020603050405020304" pitchFamily="18" charset="0"/>
                 <a:cs typeface="Times New Roman" panose="02020603050405020304" pitchFamily="18" charset="0"/>
               </a:rPr>
-              <a:t> </a:t>
-            </a:r>
-            <a:r>
-              <a:rPr lang="tr-TR" sz="3000" dirty="0" smtClean="0">
-                <a:latin typeface="Times New Roman" panose="02020603050405020304" pitchFamily="18" charset="0"/>
-                <a:cs typeface="Times New Roman" panose="02020603050405020304" pitchFamily="18" charset="0"/>
-              </a:rPr>
-              <a:t>Evaluation</a:t>
+              <a:t> Evaluation</a:t>
             </a:r>
             <a:endParaRPr lang="en-US" sz="3000" dirty="0">
               <a:latin typeface="Times New Roman" panose="02020603050405020304" pitchFamily="18" charset="0"/>

</xml_diff>

<commit_message>
PEMD presentation, prototype picture added.
</commit_message>
<xml_diff>
--- a/Paper/PEMD 2018/Presentation/PEMD2018_OralPres_Mesut_Uğur.pptx
+++ b/Paper/PEMD 2018/Presentation/PEMD2018_OralPres_Mesut_Uğur.pptx
@@ -5,7 +5,7 @@
     <p:sldMasterId id="2147483804" r:id="rId1"/>
   </p:sldMasterIdLst>
   <p:notesMasterIdLst>
-    <p:notesMasterId r:id="rId17"/>
+    <p:notesMasterId r:id="rId18"/>
   </p:notesMasterIdLst>
   <p:sldIdLst>
     <p:sldId id="290" r:id="rId2"/>
@@ -21,8 +21,9 @@
     <p:sldId id="538" r:id="rId12"/>
     <p:sldId id="532" r:id="rId13"/>
     <p:sldId id="539" r:id="rId14"/>
-    <p:sldId id="535" r:id="rId15"/>
-    <p:sldId id="523" r:id="rId16"/>
+    <p:sldId id="542" r:id="rId15"/>
+    <p:sldId id="535" r:id="rId16"/>
+    <p:sldId id="523" r:id="rId17"/>
   </p:sldIdLst>
   <p:sldSz cx="9144000" cy="6858000" type="screen4x3"/>
   <p:notesSz cx="6858000" cy="9144000"/>
@@ -900,7 +901,7 @@
     </p:spTree>
     <p:extLst>
       <p:ext uri="{BB962C8B-B14F-4D97-AF65-F5344CB8AC3E}">
-        <p14:creationId xmlns:p14="http://schemas.microsoft.com/office/powerpoint/2010/main" val="2338195712"/>
+        <p14:creationId xmlns:p14="http://schemas.microsoft.com/office/powerpoint/2010/main" val="3140249340"/>
       </p:ext>
     </p:extLst>
   </p:cSld>
@@ -976,6 +977,90 @@
             <a:fld id="{A891BBEF-D461-4390-BF4B-2B69E06247B2}" type="slidenum">
               <a:rPr lang="tr-TR" smtClean="0"/>
               <a:t>15</a:t>
+            </a:fld>
+            <a:endParaRPr lang="tr-TR"/>
+          </a:p>
+        </p:txBody>
+      </p:sp>
+    </p:spTree>
+    <p:extLst>
+      <p:ext uri="{BB962C8B-B14F-4D97-AF65-F5344CB8AC3E}">
+        <p14:creationId xmlns:p14="http://schemas.microsoft.com/office/powerpoint/2010/main" val="2338195712"/>
+      </p:ext>
+    </p:extLst>
+  </p:cSld>
+  <p:clrMapOvr>
+    <a:masterClrMapping/>
+  </p:clrMapOvr>
+</p:notes>
+</file>
+
+<file path=ppt/notesSlides/notesSlide15.xml><?xml version="1.0" encoding="utf-8"?>
+<p:notes xmlns:a="http://schemas.openxmlformats.org/drawingml/2006/main" xmlns:r="http://schemas.openxmlformats.org/officeDocument/2006/relationships" xmlns:p="http://schemas.openxmlformats.org/presentationml/2006/main">
+  <p:cSld>
+    <p:spTree>
+      <p:nvGrpSpPr>
+        <p:cNvPr id="1" name=""/>
+        <p:cNvGrpSpPr/>
+        <p:nvPr/>
+      </p:nvGrpSpPr>
+      <p:grpSpPr>
+        <a:xfrm>
+          <a:off x="0" y="0"/>
+          <a:ext cx="0" cy="0"/>
+          <a:chOff x="0" y="0"/>
+          <a:chExt cx="0" cy="0"/>
+        </a:xfrm>
+      </p:grpSpPr>
+      <p:sp>
+        <p:nvSpPr>
+          <p:cNvPr id="2" name="Slide Image Placeholder 1"/>
+          <p:cNvSpPr>
+            <a:spLocks noGrp="1" noRot="1" noChangeAspect="1"/>
+          </p:cNvSpPr>
+          <p:nvPr>
+            <p:ph type="sldImg"/>
+          </p:nvPr>
+        </p:nvSpPr>
+        <p:spPr/>
+      </p:sp>
+      <p:sp>
+        <p:nvSpPr>
+          <p:cNvPr id="3" name="Notes Placeholder 2"/>
+          <p:cNvSpPr>
+            <a:spLocks noGrp="1"/>
+          </p:cNvSpPr>
+          <p:nvPr>
+            <p:ph type="body" idx="1"/>
+          </p:nvPr>
+        </p:nvSpPr>
+        <p:spPr/>
+        <p:txBody>
+          <a:bodyPr/>
+          <a:lstStyle/>
+          <a:p>
+            <a:endParaRPr lang="en-US"/>
+          </a:p>
+        </p:txBody>
+      </p:sp>
+      <p:sp>
+        <p:nvSpPr>
+          <p:cNvPr id="4" name="Slide Number Placeholder 3"/>
+          <p:cNvSpPr>
+            <a:spLocks noGrp="1"/>
+          </p:cNvSpPr>
+          <p:nvPr>
+            <p:ph type="sldNum" sz="quarter" idx="10"/>
+          </p:nvPr>
+        </p:nvSpPr>
+        <p:spPr/>
+        <p:txBody>
+          <a:bodyPr/>
+          <a:lstStyle/>
+          <a:p>
+            <a:fld id="{A891BBEF-D461-4390-BF4B-2B69E06247B2}" type="slidenum">
+              <a:rPr lang="tr-TR" smtClean="0"/>
+              <a:t>16</a:t>
             </a:fld>
             <a:endParaRPr lang="tr-TR"/>
           </a:p>
@@ -6429,7 +6514,21 @@
                 <a:latin typeface="Helvetica" panose="020B0604020202020204" pitchFamily="34" charset="0"/>
                 <a:cs typeface="Helvetica" panose="020B0604020202020204" pitchFamily="34" charset="0"/>
               </a:rPr>
-              <a:t>/modüle/</a:t>
+              <a:t>/</a:t>
+            </a:r>
+            <a:r>
+              <a:rPr lang="tr-TR" dirty="0" err="1" smtClean="0">
+                <a:latin typeface="Helvetica" panose="020B0604020202020204" pitchFamily="34" charset="0"/>
+                <a:cs typeface="Helvetica" panose="020B0604020202020204" pitchFamily="34" charset="0"/>
+              </a:rPr>
+              <a:t>module</a:t>
+            </a:r>
+            <a:r>
+              <a:rPr lang="tr-TR" dirty="0" smtClean="0">
+                <a:latin typeface="Helvetica" panose="020B0604020202020204" pitchFamily="34" charset="0"/>
+                <a:cs typeface="Helvetica" panose="020B0604020202020204" pitchFamily="34" charset="0"/>
+              </a:rPr>
+              <a:t>/</a:t>
             </a:r>
             <a:r>
               <a:rPr lang="tr-TR" dirty="0" err="1" smtClean="0">
@@ -7231,7 +7330,7 @@
           <a:graphicData uri="http://schemas.openxmlformats.org/presentationml/2006/ole">
             <mc:AlternateContent xmlns:mc="http://schemas.openxmlformats.org/markup-compatibility/2006">
               <mc:Choice xmlns:v="urn:schemas-microsoft-com:vml" Requires="v">
-                <p:oleObj spid="_x0000_s5146" name="Visio" r:id="rId6" imgW="2485904" imgH="1866757" progId="Visio.Drawing.15">
+                <p:oleObj spid="_x0000_s5151" name="Visio" r:id="rId6" imgW="2485904" imgH="1866757" progId="Visio.Drawing.15">
                   <p:embed/>
                 </p:oleObj>
               </mc:Choice>
@@ -8627,7 +8726,7 @@
         <p:spPr>
           <a:xfrm>
             <a:off x="1386291" y="1243647"/>
-            <a:ext cx="7681509" cy="5109091"/>
+            <a:ext cx="7681509" cy="3816429"/>
           </a:xfrm>
           <a:prstGeom prst="rect">
             <a:avLst/>
@@ -8786,7 +8885,7 @@
                 <a:ea typeface="Times New Roman" panose="02020603050405020304" pitchFamily="18" charset="0"/>
                 <a:cs typeface="Helvetica" panose="020B0604020202020204" pitchFamily="34" charset="0"/>
               </a:rPr>
-              <a:t>Cost limitations, m</a:t>
+              <a:t>Cost </a:t>
             </a:r>
             <a:r>
               <a:rPr lang="en-US" dirty="0" smtClean="0">
@@ -8794,7 +8893,23 @@
                 <a:ea typeface="Times New Roman" panose="02020603050405020304" pitchFamily="18" charset="0"/>
                 <a:cs typeface="Helvetica" panose="020B0604020202020204" pitchFamily="34" charset="0"/>
               </a:rPr>
-              <a:t>anufacturability and f</a:t>
+              <a:t>limitations</a:t>
+            </a:r>
+            <a:r>
+              <a:rPr lang="tr-TR" dirty="0" smtClean="0">
+                <a:latin typeface="Hevletica"/>
+                <a:ea typeface="Times New Roman" panose="02020603050405020304" pitchFamily="18" charset="0"/>
+                <a:cs typeface="Helvetica" panose="020B0604020202020204" pitchFamily="34" charset="0"/>
+              </a:rPr>
+              <a:t> </a:t>
+            </a:r>
+            <a:r>
+              <a:rPr lang="tr-TR" dirty="0" err="1" smtClean="0">
+                <a:latin typeface="Hevletica"/>
+                <a:ea typeface="Times New Roman" panose="02020603050405020304" pitchFamily="18" charset="0"/>
+                <a:cs typeface="Helvetica" panose="020B0604020202020204" pitchFamily="34" charset="0"/>
+              </a:rPr>
+              <a:t>and</a:t>
             </a:r>
             <a:r>
               <a:rPr lang="en-US" dirty="0" smtClean="0">
@@ -8802,8 +8917,13 @@
                 <a:ea typeface="Times New Roman" panose="02020603050405020304" pitchFamily="18" charset="0"/>
                 <a:cs typeface="Helvetica" panose="020B0604020202020204" pitchFamily="34" charset="0"/>
               </a:rPr>
-              <a:t>ault tolerance</a:t>
-            </a:r>
+              <a:t> manufacturability</a:t>
+            </a:r>
+            <a:endParaRPr lang="tr-TR" dirty="0" smtClean="0">
+              <a:latin typeface="Hevletica"/>
+              <a:ea typeface="Times New Roman" panose="02020603050405020304" pitchFamily="18" charset="0"/>
+              <a:cs typeface="Helvetica" panose="020B0604020202020204" pitchFamily="34" charset="0"/>
+            </a:endParaRPr>
           </a:p>
           <a:p>
             <a:pPr marL="285750" indent="-285750" algn="just">
@@ -8813,79 +8933,38 @@
               <a:buFont typeface="Wingdings" panose="05000000000000000000" pitchFamily="2" charset="2"/>
               <a:buChar char="ü"/>
             </a:pPr>
-            <a:endParaRPr lang="en-US" dirty="0">
-              <a:latin typeface="Hevletica"/>
-              <a:ea typeface="Times New Roman" panose="02020603050405020304" pitchFamily="18" charset="0"/>
-              <a:cs typeface="Helvetica" panose="020B0604020202020204" pitchFamily="34" charset="0"/>
-            </a:endParaRPr>
-          </a:p>
-          <a:p>
-            <a:pPr marL="285750" indent="-285750" algn="just">
-              <a:spcAft>
-                <a:spcPts val="1200"/>
-              </a:spcAft>
-              <a:buFont typeface="Wingdings" panose="05000000000000000000" pitchFamily="2" charset="2"/>
-              <a:buChar char="ü"/>
-            </a:pPr>
-            <a:r>
-              <a:rPr lang="en-US" dirty="0" smtClean="0">
-                <a:solidFill>
-                  <a:srgbClr val="2515F7"/>
-                </a:solidFill>
+            <a:r>
+              <a:rPr lang="tr-TR" smtClean="0">
                 <a:latin typeface="Hevletica"/>
                 <a:ea typeface="Times New Roman" panose="02020603050405020304" pitchFamily="18" charset="0"/>
                 <a:cs typeface="Helvetica" panose="020B0604020202020204" pitchFamily="34" charset="0"/>
               </a:rPr>
-              <a:t>Inclusion of torque ripple, cogging torque, vibration effects</a:t>
-            </a:r>
-          </a:p>
-          <a:p>
-            <a:pPr marL="285750" indent="-285750" algn="just">
-              <a:spcAft>
-                <a:spcPts val="1200"/>
-              </a:spcAft>
-              <a:buFont typeface="Wingdings" panose="05000000000000000000" pitchFamily="2" charset="2"/>
-              <a:buChar char="ü"/>
-            </a:pPr>
-            <a:r>
-              <a:rPr lang="en-US" dirty="0" smtClean="0">
-                <a:solidFill>
-                  <a:srgbClr val="2515F7"/>
-                </a:solidFill>
+              <a:t>F</a:t>
+            </a:r>
+            <a:r>
+              <a:rPr lang="en-US" smtClean="0">
                 <a:latin typeface="Hevletica"/>
                 <a:ea typeface="Times New Roman" panose="02020603050405020304" pitchFamily="18" charset="0"/>
                 <a:cs typeface="Helvetica" panose="020B0604020202020204" pitchFamily="34" charset="0"/>
               </a:rPr>
-              <a:t>Inclusion of motor thermal model and EMI effects</a:t>
-            </a:r>
-          </a:p>
-          <a:p>
-            <a:pPr marL="285750" indent="-285750" algn="just">
-              <a:spcAft>
-                <a:spcPts val="1200"/>
-              </a:spcAft>
-              <a:buFont typeface="Wingdings" panose="05000000000000000000" pitchFamily="2" charset="2"/>
-              <a:buChar char="ü"/>
-            </a:pPr>
+              <a:t>ault</a:t>
+            </a:r>
             <a:r>
               <a:rPr lang="en-US" dirty="0" smtClean="0">
-                <a:solidFill>
-                  <a:srgbClr val="2515F7"/>
-                </a:solidFill>
                 <a:latin typeface="Hevletica"/>
                 <a:ea typeface="Times New Roman" panose="02020603050405020304" pitchFamily="18" charset="0"/>
                 <a:cs typeface="Helvetica" panose="020B0604020202020204" pitchFamily="34" charset="0"/>
               </a:rPr>
-              <a:t>A prototype is under construction with the optimum design parameters </a:t>
-            </a:r>
-            <a:endParaRPr lang="tr-TR" dirty="0" smtClean="0">
-              <a:solidFill>
-                <a:srgbClr val="2515F7"/>
-              </a:solidFill>
-              <a:latin typeface="Hevletica"/>
-              <a:ea typeface="Times New Roman" panose="02020603050405020304" pitchFamily="18" charset="0"/>
-              <a:cs typeface="Helvetica" panose="020B0604020202020204" pitchFamily="34" charset="0"/>
-            </a:endParaRPr>
+              <a:t> </a:t>
+            </a:r>
+            <a:r>
+              <a:rPr lang="en-US" dirty="0" smtClean="0">
+                <a:latin typeface="Hevletica"/>
+                <a:ea typeface="Times New Roman" panose="02020603050405020304" pitchFamily="18" charset="0"/>
+                <a:cs typeface="Helvetica" panose="020B0604020202020204" pitchFamily="34" charset="0"/>
+              </a:rPr>
+              <a:t>tolerance</a:t>
+            </a:r>
           </a:p>
         </p:txBody>
       </p:sp>
@@ -9327,105 +9406,7 @@
                                         <p:tgtEl>
                                           <p:spTgt spid="24">
                                             <p:txEl>
-                                              <p:pRg st="9" end="9"/>
-                                            </p:txEl>
-                                          </p:spTgt>
-                                        </p:tgtEl>
-                                        <p:attrNameLst>
-                                          <p:attrName>style.visibility</p:attrName>
-                                        </p:attrNameLst>
-                                      </p:cBhvr>
-                                      <p:to>
-                                        <p:strVal val="visible"/>
-                                      </p:to>
-                                    </p:set>
-                                  </p:childTnLst>
-                                </p:cTn>
-                              </p:par>
-                            </p:childTnLst>
-                          </p:cTn>
-                        </p:par>
-                      </p:childTnLst>
-                    </p:cTn>
-                  </p:par>
-                  <p:par>
-                    <p:cTn id="39" fill="hold">
-                      <p:stCondLst>
-                        <p:cond delay="indefinite"/>
-                      </p:stCondLst>
-                      <p:childTnLst>
-                        <p:par>
-                          <p:cTn id="40" fill="hold">
-                            <p:stCondLst>
-                              <p:cond delay="0"/>
-                            </p:stCondLst>
-                            <p:childTnLst>
-                              <p:par>
-                                <p:cTn id="41" presetID="1" presetClass="entr" presetSubtype="0" fill="hold" nodeType="clickEffect">
-                                  <p:stCondLst>
-                                    <p:cond delay="0"/>
-                                  </p:stCondLst>
-                                  <p:childTnLst>
-                                    <p:set>
-                                      <p:cBhvr>
-                                        <p:cTn id="42" dur="1" fill="hold">
-                                          <p:stCondLst>
-                                            <p:cond delay="0"/>
-                                          </p:stCondLst>
-                                        </p:cTn>
-                                        <p:tgtEl>
-                                          <p:spTgt spid="24">
-                                            <p:txEl>
-                                              <p:pRg st="10" end="10"/>
-                                            </p:txEl>
-                                          </p:spTgt>
-                                        </p:tgtEl>
-                                        <p:attrNameLst>
-                                          <p:attrName>style.visibility</p:attrName>
-                                        </p:attrNameLst>
-                                      </p:cBhvr>
-                                      <p:to>
-                                        <p:strVal val="visible"/>
-                                      </p:to>
-                                    </p:set>
-                                  </p:childTnLst>
-                                </p:cTn>
-                              </p:par>
-                            </p:childTnLst>
-                          </p:cTn>
-                        </p:par>
-                      </p:childTnLst>
-                    </p:cTn>
-                  </p:par>
-                  <p:par>
-                    <p:cTn id="43" fill="hold">
-                      <p:stCondLst>
-                        <p:cond delay="indefinite"/>
-                      </p:stCondLst>
-                      <p:childTnLst>
-                        <p:par>
-                          <p:cTn id="44" fill="hold">
-                            <p:stCondLst>
-                              <p:cond delay="0"/>
-                            </p:stCondLst>
-                            <p:childTnLst>
-                              <p:par>
-                                <p:cTn id="45" presetID="1" presetClass="entr" presetSubtype="0" fill="hold" nodeType="clickEffect">
-                                  <p:stCondLst>
-                                    <p:cond delay="0"/>
-                                  </p:stCondLst>
-                                  <p:childTnLst>
-                                    <p:set>
-                                      <p:cBhvr>
-                                        <p:cTn id="46" dur="1" fill="hold">
-                                          <p:stCondLst>
-                                            <p:cond delay="0"/>
-                                          </p:stCondLst>
-                                        </p:cTn>
-                                        <p:tgtEl>
-                                          <p:spTgt spid="24">
-                                            <p:txEl>
-                                              <p:pRg st="11" end="11"/>
+                                              <p:pRg st="8" end="8"/>
                                             </p:txEl>
                                           </p:spTgt>
                                         </p:tgtEl>
@@ -9615,7 +9596,21 @@
                 <a:latin typeface="Times New Roman" panose="02020603050405020304" pitchFamily="18" charset="0"/>
                 <a:cs typeface="Times New Roman" panose="02020603050405020304" pitchFamily="18" charset="0"/>
               </a:rPr>
-              <a:t>References</a:t>
+              <a:t>Future</a:t>
+            </a:r>
+            <a:r>
+              <a:rPr lang="tr-TR" sz="3000" dirty="0" smtClean="0">
+                <a:latin typeface="Times New Roman" panose="02020603050405020304" pitchFamily="18" charset="0"/>
+                <a:cs typeface="Times New Roman" panose="02020603050405020304" pitchFamily="18" charset="0"/>
+              </a:rPr>
+              <a:t> </a:t>
+            </a:r>
+            <a:r>
+              <a:rPr lang="tr-TR" sz="3000" dirty="0" err="1" smtClean="0">
+                <a:latin typeface="Times New Roman" panose="02020603050405020304" pitchFamily="18" charset="0"/>
+                <a:cs typeface="Times New Roman" panose="02020603050405020304" pitchFamily="18" charset="0"/>
+              </a:rPr>
+              <a:t>Work</a:t>
             </a:r>
             <a:endParaRPr lang="en-US" sz="3000" dirty="0">
               <a:latin typeface="Times New Roman" panose="02020603050405020304" pitchFamily="18" charset="0"/>
@@ -9875,14 +9870,14 @@
       </p:sp>
       <p:sp>
         <p:nvSpPr>
-          <p:cNvPr id="16" name="Rectangle 15"/>
+          <p:cNvPr id="24" name="Rectangle 23"/>
           <p:cNvSpPr/>
           <p:nvPr/>
         </p:nvSpPr>
         <p:spPr>
           <a:xfrm>
-            <a:off x="1066800" y="1295400"/>
-            <a:ext cx="8077200" cy="4893647"/>
+            <a:off x="1386291" y="1243647"/>
+            <a:ext cx="7681509" cy="1231106"/>
           </a:xfrm>
           <a:prstGeom prst="rect">
             <a:avLst/>
@@ -9894,827 +9889,109 @@
           </a:bodyPr>
           <a:lstStyle/>
           <a:p>
-            <a:r>
-              <a:rPr lang="en-US" sz="1200" dirty="0">
-                <a:latin typeface="Helvetica" panose="020B0604020202020204" pitchFamily="34" charset="0"/>
+            <a:pPr marL="285750" indent="-285750" algn="just">
+              <a:spcAft>
+                <a:spcPts val="1200"/>
+              </a:spcAft>
+              <a:buFont typeface="Wingdings" panose="05000000000000000000" pitchFamily="2" charset="2"/>
+              <a:buChar char="ü"/>
+            </a:pPr>
+            <a:r>
+              <a:rPr lang="en-US" dirty="0" smtClean="0">
+                <a:solidFill>
+                  <a:srgbClr val="2515F7"/>
+                </a:solidFill>
+                <a:latin typeface="Hevletica"/>
+                <a:ea typeface="Times New Roman" panose="02020603050405020304" pitchFamily="18" charset="0"/>
                 <a:cs typeface="Helvetica" panose="020B0604020202020204" pitchFamily="34" charset="0"/>
               </a:rPr>
-              <a:t>[</a:t>
-            </a:r>
-            <a:r>
-              <a:rPr lang="en-US" sz="1200" dirty="0" smtClean="0">
-                <a:latin typeface="Helvetica" panose="020B0604020202020204" pitchFamily="34" charset="0"/>
+              <a:t>Inclusion of torque ripple, cogging torque, vibration effects</a:t>
+            </a:r>
+          </a:p>
+          <a:p>
+            <a:pPr marL="285750" indent="-285750" algn="just">
+              <a:spcAft>
+                <a:spcPts val="1200"/>
+              </a:spcAft>
+              <a:buFont typeface="Wingdings" panose="05000000000000000000" pitchFamily="2" charset="2"/>
+              <a:buChar char="ü"/>
+            </a:pPr>
+            <a:r>
+              <a:rPr lang="en-US" dirty="0" smtClean="0">
+                <a:solidFill>
+                  <a:srgbClr val="2515F7"/>
+                </a:solidFill>
+                <a:latin typeface="Hevletica"/>
+                <a:ea typeface="Times New Roman" panose="02020603050405020304" pitchFamily="18" charset="0"/>
                 <a:cs typeface="Helvetica" panose="020B0604020202020204" pitchFamily="34" charset="0"/>
               </a:rPr>
-              <a:t>1]</a:t>
-            </a:r>
-            <a:r>
-              <a:rPr lang="tr-TR" sz="1200" dirty="0" smtClean="0">
-                <a:latin typeface="Helvetica" panose="020B0604020202020204" pitchFamily="34" charset="0"/>
+              <a:t>Inclusion of motor thermal model and EMI effects</a:t>
+            </a:r>
+          </a:p>
+          <a:p>
+            <a:pPr marL="285750" indent="-285750" algn="just">
+              <a:spcAft>
+                <a:spcPts val="1200"/>
+              </a:spcAft>
+              <a:buFont typeface="Wingdings" panose="05000000000000000000" pitchFamily="2" charset="2"/>
+              <a:buChar char="ü"/>
+            </a:pPr>
+            <a:r>
+              <a:rPr lang="en-US" dirty="0" smtClean="0">
+                <a:solidFill>
+                  <a:srgbClr val="2515F7"/>
+                </a:solidFill>
+                <a:latin typeface="Hevletica"/>
+                <a:ea typeface="Times New Roman" panose="02020603050405020304" pitchFamily="18" charset="0"/>
                 <a:cs typeface="Helvetica" panose="020B0604020202020204" pitchFamily="34" charset="0"/>
               </a:rPr>
-              <a:t> </a:t>
-            </a:r>
-            <a:r>
-              <a:rPr lang="en-US" sz="1200" dirty="0" smtClean="0">
-                <a:latin typeface="Helvetica" panose="020B0604020202020204" pitchFamily="34" charset="0"/>
-                <a:cs typeface="Helvetica" panose="020B0604020202020204" pitchFamily="34" charset="0"/>
-              </a:rPr>
-              <a:t>G</a:t>
-            </a:r>
-            <a:r>
-              <a:rPr lang="en-US" sz="1200" dirty="0">
-                <a:latin typeface="Helvetica" panose="020B0604020202020204" pitchFamily="34" charset="0"/>
-                <a:cs typeface="Helvetica" panose="020B0604020202020204" pitchFamily="34" charset="0"/>
-              </a:rPr>
-              <a:t>. Lo </a:t>
-            </a:r>
-            <a:r>
-              <a:rPr lang="en-US" sz="1200" dirty="0" err="1">
-                <a:latin typeface="Helvetica" panose="020B0604020202020204" pitchFamily="34" charset="0"/>
-                <a:cs typeface="Helvetica" panose="020B0604020202020204" pitchFamily="34" charset="0"/>
-              </a:rPr>
-              <a:t>Calzo</a:t>
-            </a:r>
-            <a:r>
-              <a:rPr lang="en-US" sz="1200" dirty="0">
-                <a:latin typeface="Helvetica" panose="020B0604020202020204" pitchFamily="34" charset="0"/>
-                <a:cs typeface="Helvetica" panose="020B0604020202020204" pitchFamily="34" charset="0"/>
-              </a:rPr>
-              <a:t>, G. </a:t>
-            </a:r>
-            <a:r>
-              <a:rPr lang="en-US" sz="1200" dirty="0" err="1">
-                <a:latin typeface="Helvetica" panose="020B0604020202020204" pitchFamily="34" charset="0"/>
-                <a:cs typeface="Helvetica" panose="020B0604020202020204" pitchFamily="34" charset="0"/>
-              </a:rPr>
-              <a:t>Vakil</a:t>
-            </a:r>
-            <a:r>
-              <a:rPr lang="en-US" sz="1200" dirty="0">
-                <a:latin typeface="Helvetica" panose="020B0604020202020204" pitchFamily="34" charset="0"/>
-                <a:cs typeface="Helvetica" panose="020B0604020202020204" pitchFamily="34" charset="0"/>
-              </a:rPr>
-              <a:t>, B. </a:t>
-            </a:r>
-            <a:r>
-              <a:rPr lang="en-US" sz="1200" dirty="0" err="1">
-                <a:latin typeface="Helvetica" panose="020B0604020202020204" pitchFamily="34" charset="0"/>
-                <a:cs typeface="Helvetica" panose="020B0604020202020204" pitchFamily="34" charset="0"/>
-              </a:rPr>
-              <a:t>Mecrow</a:t>
-            </a:r>
-            <a:r>
-              <a:rPr lang="en-US" sz="1200" dirty="0">
-                <a:latin typeface="Helvetica" panose="020B0604020202020204" pitchFamily="34" charset="0"/>
-                <a:cs typeface="Helvetica" panose="020B0604020202020204" pitchFamily="34" charset="0"/>
-              </a:rPr>
-              <a:t>, S. Lambert, T. Cox, C. </a:t>
-            </a:r>
-            <a:r>
-              <a:rPr lang="en-US" sz="1200" dirty="0" err="1">
-                <a:latin typeface="Helvetica" panose="020B0604020202020204" pitchFamily="34" charset="0"/>
-                <a:cs typeface="Helvetica" panose="020B0604020202020204" pitchFamily="34" charset="0"/>
-              </a:rPr>
-              <a:t>Gerada</a:t>
-            </a:r>
-            <a:r>
-              <a:rPr lang="en-US" sz="1200" dirty="0">
-                <a:latin typeface="Helvetica" panose="020B0604020202020204" pitchFamily="34" charset="0"/>
-                <a:cs typeface="Helvetica" panose="020B0604020202020204" pitchFamily="34" charset="0"/>
-              </a:rPr>
-              <a:t>, M. Johnson, and R. </a:t>
-            </a:r>
-            <a:r>
-              <a:rPr lang="en-US" sz="1200" dirty="0" err="1">
-                <a:latin typeface="Helvetica" panose="020B0604020202020204" pitchFamily="34" charset="0"/>
-                <a:cs typeface="Helvetica" panose="020B0604020202020204" pitchFamily="34" charset="0"/>
-              </a:rPr>
-              <a:t>Abebe</a:t>
-            </a:r>
-            <a:r>
-              <a:rPr lang="en-US" sz="1200" dirty="0">
-                <a:latin typeface="Helvetica" panose="020B0604020202020204" pitchFamily="34" charset="0"/>
-                <a:cs typeface="Helvetica" panose="020B0604020202020204" pitchFamily="34" charset="0"/>
-              </a:rPr>
-              <a:t>, “Integrated motor drives: state of the art and future trends,” </a:t>
-            </a:r>
-            <a:r>
-              <a:rPr lang="en-US" sz="1200" i="1" dirty="0">
-                <a:latin typeface="Helvetica" panose="020B0604020202020204" pitchFamily="34" charset="0"/>
-                <a:cs typeface="Helvetica" panose="020B0604020202020204" pitchFamily="34" charset="0"/>
-              </a:rPr>
-              <a:t>IET </a:t>
-            </a:r>
-            <a:r>
-              <a:rPr lang="en-US" sz="1200" i="1" dirty="0" err="1">
-                <a:latin typeface="Helvetica" panose="020B0604020202020204" pitchFamily="34" charset="0"/>
-                <a:cs typeface="Helvetica" panose="020B0604020202020204" pitchFamily="34" charset="0"/>
-              </a:rPr>
-              <a:t>Electr</a:t>
-            </a:r>
-            <a:r>
-              <a:rPr lang="en-US" sz="1200" i="1" dirty="0">
-                <a:latin typeface="Helvetica" panose="020B0604020202020204" pitchFamily="34" charset="0"/>
-                <a:cs typeface="Helvetica" panose="020B0604020202020204" pitchFamily="34" charset="0"/>
-              </a:rPr>
-              <a:t>. Power Appl.</a:t>
-            </a:r>
-            <a:r>
-              <a:rPr lang="en-US" sz="1200" dirty="0">
-                <a:latin typeface="Helvetica" panose="020B0604020202020204" pitchFamily="34" charset="0"/>
-                <a:cs typeface="Helvetica" panose="020B0604020202020204" pitchFamily="34" charset="0"/>
-              </a:rPr>
-              <a:t>, vol. 10, no. 8, pp. 757–771, Sep. 2016</a:t>
-            </a:r>
-            <a:r>
-              <a:rPr lang="en-US" sz="1200" dirty="0" smtClean="0">
-                <a:latin typeface="Helvetica" panose="020B0604020202020204" pitchFamily="34" charset="0"/>
-                <a:cs typeface="Helvetica" panose="020B0604020202020204" pitchFamily="34" charset="0"/>
-              </a:rPr>
-              <a:t>.</a:t>
-            </a:r>
-            <a:endParaRPr lang="tr-TR" sz="1200" dirty="0" smtClean="0">
-              <a:latin typeface="Helvetica" panose="020B0604020202020204" pitchFamily="34" charset="0"/>
+              <a:t>A prototype is under construction with the optimum design parameters </a:t>
+            </a:r>
+            <a:endParaRPr lang="tr-TR" dirty="0" smtClean="0">
+              <a:solidFill>
+                <a:srgbClr val="2515F7"/>
+              </a:solidFill>
+              <a:latin typeface="Hevletica"/>
+              <a:ea typeface="Times New Roman" panose="02020603050405020304" pitchFamily="18" charset="0"/>
               <a:cs typeface="Helvetica" panose="020B0604020202020204" pitchFamily="34" charset="0"/>
             </a:endParaRPr>
           </a:p>
-          <a:p>
-            <a:endParaRPr lang="en-US" sz="1200" dirty="0">
-              <a:latin typeface="Helvetica" panose="020B0604020202020204" pitchFamily="34" charset="0"/>
-              <a:cs typeface="Helvetica" panose="020B0604020202020204" pitchFamily="34" charset="0"/>
-            </a:endParaRPr>
-          </a:p>
-          <a:p>
-            <a:r>
-              <a:rPr lang="en-US" sz="1200" dirty="0">
-                <a:latin typeface="Helvetica" panose="020B0604020202020204" pitchFamily="34" charset="0"/>
-                <a:cs typeface="Helvetica" panose="020B0604020202020204" pitchFamily="34" charset="0"/>
-              </a:rPr>
-              <a:t>[</a:t>
-            </a:r>
-            <a:r>
-              <a:rPr lang="en-US" sz="1200" dirty="0" smtClean="0">
-                <a:latin typeface="Helvetica" panose="020B0604020202020204" pitchFamily="34" charset="0"/>
-                <a:cs typeface="Helvetica" panose="020B0604020202020204" pitchFamily="34" charset="0"/>
-              </a:rPr>
-              <a:t>2]</a:t>
-            </a:r>
-            <a:r>
-              <a:rPr lang="tr-TR" sz="1200" dirty="0" smtClean="0">
-                <a:latin typeface="Helvetica" panose="020B0604020202020204" pitchFamily="34" charset="0"/>
-                <a:cs typeface="Helvetica" panose="020B0604020202020204" pitchFamily="34" charset="0"/>
-              </a:rPr>
-              <a:t> </a:t>
-            </a:r>
-            <a:r>
-              <a:rPr lang="en-US" sz="1200" dirty="0" smtClean="0">
-                <a:latin typeface="Helvetica" panose="020B0604020202020204" pitchFamily="34" charset="0"/>
-                <a:cs typeface="Helvetica" panose="020B0604020202020204" pitchFamily="34" charset="0"/>
-              </a:rPr>
-              <a:t>M</a:t>
-            </a:r>
-            <a:r>
-              <a:rPr lang="en-US" sz="1200" dirty="0">
-                <a:latin typeface="Helvetica" panose="020B0604020202020204" pitchFamily="34" charset="0"/>
-                <a:cs typeface="Helvetica" panose="020B0604020202020204" pitchFamily="34" charset="0"/>
-              </a:rPr>
-              <a:t>. D. </a:t>
-            </a:r>
-            <a:r>
-              <a:rPr lang="en-US" sz="1200" dirty="0" err="1">
-                <a:latin typeface="Helvetica" panose="020B0604020202020204" pitchFamily="34" charset="0"/>
-                <a:cs typeface="Helvetica" panose="020B0604020202020204" pitchFamily="34" charset="0"/>
-              </a:rPr>
-              <a:t>Hennen</a:t>
-            </a:r>
-            <a:r>
-              <a:rPr lang="en-US" sz="1200" dirty="0">
-                <a:latin typeface="Helvetica" panose="020B0604020202020204" pitchFamily="34" charset="0"/>
-                <a:cs typeface="Helvetica" panose="020B0604020202020204" pitchFamily="34" charset="0"/>
-              </a:rPr>
-              <a:t>, M. </a:t>
-            </a:r>
-            <a:r>
-              <a:rPr lang="en-US" sz="1200" dirty="0" err="1">
-                <a:latin typeface="Helvetica" panose="020B0604020202020204" pitchFamily="34" charset="0"/>
-                <a:cs typeface="Helvetica" panose="020B0604020202020204" pitchFamily="34" charset="0"/>
-              </a:rPr>
-              <a:t>Niessen</a:t>
-            </a:r>
-            <a:r>
-              <a:rPr lang="en-US" sz="1200" dirty="0">
-                <a:latin typeface="Helvetica" panose="020B0604020202020204" pitchFamily="34" charset="0"/>
-                <a:cs typeface="Helvetica" panose="020B0604020202020204" pitchFamily="34" charset="0"/>
-              </a:rPr>
-              <a:t>, C. </a:t>
-            </a:r>
-            <a:r>
-              <a:rPr lang="en-US" sz="1200" dirty="0" err="1">
-                <a:latin typeface="Helvetica" panose="020B0604020202020204" pitchFamily="34" charset="0"/>
-                <a:cs typeface="Helvetica" panose="020B0604020202020204" pitchFamily="34" charset="0"/>
-              </a:rPr>
-              <a:t>Heyers</a:t>
-            </a:r>
-            <a:r>
-              <a:rPr lang="en-US" sz="1200" dirty="0">
-                <a:latin typeface="Helvetica" panose="020B0604020202020204" pitchFamily="34" charset="0"/>
-                <a:cs typeface="Helvetica" panose="020B0604020202020204" pitchFamily="34" charset="0"/>
-              </a:rPr>
-              <a:t>, H. J. </a:t>
-            </a:r>
-            <a:r>
-              <a:rPr lang="en-US" sz="1200" dirty="0" err="1">
-                <a:latin typeface="Helvetica" panose="020B0604020202020204" pitchFamily="34" charset="0"/>
-                <a:cs typeface="Helvetica" panose="020B0604020202020204" pitchFamily="34" charset="0"/>
-              </a:rPr>
-              <a:t>Brauer</a:t>
-            </a:r>
-            <a:r>
-              <a:rPr lang="en-US" sz="1200" dirty="0">
-                <a:latin typeface="Helvetica" panose="020B0604020202020204" pitchFamily="34" charset="0"/>
-                <a:cs typeface="Helvetica" panose="020B0604020202020204" pitchFamily="34" charset="0"/>
-              </a:rPr>
-              <a:t>, and R. W. De </a:t>
-            </a:r>
-            <a:r>
-              <a:rPr lang="en-US" sz="1200" dirty="0" err="1">
-                <a:latin typeface="Helvetica" panose="020B0604020202020204" pitchFamily="34" charset="0"/>
-                <a:cs typeface="Helvetica" panose="020B0604020202020204" pitchFamily="34" charset="0"/>
-              </a:rPr>
-              <a:t>Doncker</a:t>
-            </a:r>
-            <a:r>
-              <a:rPr lang="en-US" sz="1200" dirty="0">
-                <a:latin typeface="Helvetica" panose="020B0604020202020204" pitchFamily="34" charset="0"/>
-                <a:cs typeface="Helvetica" panose="020B0604020202020204" pitchFamily="34" charset="0"/>
-              </a:rPr>
-              <a:t>, “Development and control of an integrated and distributed inverter for a fault tolerant five-phase switched reluctance traction drive,” </a:t>
-            </a:r>
-            <a:r>
-              <a:rPr lang="en-US" sz="1200" i="1" dirty="0">
-                <a:latin typeface="Helvetica" panose="020B0604020202020204" pitchFamily="34" charset="0"/>
-                <a:cs typeface="Helvetica" panose="020B0604020202020204" pitchFamily="34" charset="0"/>
-              </a:rPr>
-              <a:t>IEEE Trans. Power Electron.</a:t>
-            </a:r>
-            <a:r>
-              <a:rPr lang="en-US" sz="1200" dirty="0">
-                <a:latin typeface="Helvetica" panose="020B0604020202020204" pitchFamily="34" charset="0"/>
-                <a:cs typeface="Helvetica" panose="020B0604020202020204" pitchFamily="34" charset="0"/>
-              </a:rPr>
-              <a:t>, vol. 27, no. 2, pp. 547–554, 2012</a:t>
-            </a:r>
-            <a:r>
-              <a:rPr lang="en-US" sz="1200" dirty="0" smtClean="0">
-                <a:latin typeface="Helvetica" panose="020B0604020202020204" pitchFamily="34" charset="0"/>
-                <a:cs typeface="Helvetica" panose="020B0604020202020204" pitchFamily="34" charset="0"/>
-              </a:rPr>
-              <a:t>.</a:t>
-            </a:r>
-            <a:endParaRPr lang="tr-TR" sz="1200" dirty="0" smtClean="0">
-              <a:latin typeface="Helvetica" panose="020B0604020202020204" pitchFamily="34" charset="0"/>
-              <a:cs typeface="Helvetica" panose="020B0604020202020204" pitchFamily="34" charset="0"/>
-            </a:endParaRPr>
-          </a:p>
-          <a:p>
-            <a:endParaRPr lang="en-US" sz="1200" dirty="0">
-              <a:latin typeface="Helvetica" panose="020B0604020202020204" pitchFamily="34" charset="0"/>
-              <a:cs typeface="Helvetica" panose="020B0604020202020204" pitchFamily="34" charset="0"/>
-            </a:endParaRPr>
-          </a:p>
-          <a:p>
-            <a:r>
-              <a:rPr lang="en-US" sz="1200" dirty="0">
-                <a:latin typeface="Helvetica" panose="020B0604020202020204" pitchFamily="34" charset="0"/>
-                <a:cs typeface="Helvetica" panose="020B0604020202020204" pitchFamily="34" charset="0"/>
-              </a:rPr>
-              <a:t>[</a:t>
-            </a:r>
-            <a:r>
-              <a:rPr lang="en-US" sz="1200" dirty="0" smtClean="0">
-                <a:latin typeface="Helvetica" panose="020B0604020202020204" pitchFamily="34" charset="0"/>
-                <a:cs typeface="Helvetica" panose="020B0604020202020204" pitchFamily="34" charset="0"/>
-              </a:rPr>
-              <a:t>3]</a:t>
-            </a:r>
-            <a:r>
-              <a:rPr lang="tr-TR" sz="1200" dirty="0" smtClean="0">
-                <a:latin typeface="Helvetica" panose="020B0604020202020204" pitchFamily="34" charset="0"/>
-                <a:cs typeface="Helvetica" panose="020B0604020202020204" pitchFamily="34" charset="0"/>
-              </a:rPr>
-              <a:t> </a:t>
-            </a:r>
-            <a:r>
-              <a:rPr lang="en-US" sz="1200" dirty="0" smtClean="0">
-                <a:latin typeface="Helvetica" panose="020B0604020202020204" pitchFamily="34" charset="0"/>
-                <a:cs typeface="Helvetica" panose="020B0604020202020204" pitchFamily="34" charset="0"/>
-              </a:rPr>
-              <a:t>J</a:t>
-            </a:r>
-            <a:r>
-              <a:rPr lang="en-US" sz="1200" dirty="0">
-                <a:latin typeface="Helvetica" panose="020B0604020202020204" pitchFamily="34" charset="0"/>
-                <a:cs typeface="Helvetica" panose="020B0604020202020204" pitchFamily="34" charset="0"/>
-              </a:rPr>
-              <a:t>. Wang, Y. Li, and Y. Han, “Integrated Modular Motor Drive Design With GaN Power FETs,” </a:t>
-            </a:r>
-            <a:r>
-              <a:rPr lang="en-US" sz="1200" i="1" dirty="0">
-                <a:latin typeface="Helvetica" panose="020B0604020202020204" pitchFamily="34" charset="0"/>
-                <a:cs typeface="Helvetica" panose="020B0604020202020204" pitchFamily="34" charset="0"/>
-              </a:rPr>
-              <a:t>IEEE Trans. Ind. Appl.</a:t>
-            </a:r>
-            <a:r>
-              <a:rPr lang="en-US" sz="1200" dirty="0">
-                <a:latin typeface="Helvetica" panose="020B0604020202020204" pitchFamily="34" charset="0"/>
-                <a:cs typeface="Helvetica" panose="020B0604020202020204" pitchFamily="34" charset="0"/>
-              </a:rPr>
-              <a:t>, vol. 51, no. c, pp. 3198–3207, 2015</a:t>
-            </a:r>
-            <a:r>
-              <a:rPr lang="en-US" sz="1200" dirty="0" smtClean="0">
-                <a:latin typeface="Helvetica" panose="020B0604020202020204" pitchFamily="34" charset="0"/>
-                <a:cs typeface="Helvetica" panose="020B0604020202020204" pitchFamily="34" charset="0"/>
-              </a:rPr>
-              <a:t>.</a:t>
-            </a:r>
-            <a:endParaRPr lang="tr-TR" sz="1200" dirty="0" smtClean="0">
-              <a:latin typeface="Helvetica" panose="020B0604020202020204" pitchFamily="34" charset="0"/>
-              <a:cs typeface="Helvetica" panose="020B0604020202020204" pitchFamily="34" charset="0"/>
-            </a:endParaRPr>
-          </a:p>
-          <a:p>
-            <a:endParaRPr lang="en-US" sz="1200" dirty="0">
-              <a:latin typeface="Helvetica" panose="020B0604020202020204" pitchFamily="34" charset="0"/>
-              <a:cs typeface="Helvetica" panose="020B0604020202020204" pitchFamily="34" charset="0"/>
-            </a:endParaRPr>
-          </a:p>
-          <a:p>
-            <a:r>
-              <a:rPr lang="en-US" sz="1200" dirty="0">
-                <a:latin typeface="Helvetica" panose="020B0604020202020204" pitchFamily="34" charset="0"/>
-                <a:cs typeface="Helvetica" panose="020B0604020202020204" pitchFamily="34" charset="0"/>
-              </a:rPr>
-              <a:t>[</a:t>
-            </a:r>
-            <a:r>
-              <a:rPr lang="en-US" sz="1200" dirty="0" smtClean="0">
-                <a:latin typeface="Helvetica" panose="020B0604020202020204" pitchFamily="34" charset="0"/>
-                <a:cs typeface="Helvetica" panose="020B0604020202020204" pitchFamily="34" charset="0"/>
-              </a:rPr>
-              <a:t>4]</a:t>
-            </a:r>
-            <a:r>
-              <a:rPr lang="tr-TR" sz="1200" dirty="0" smtClean="0">
-                <a:latin typeface="Helvetica" panose="020B0604020202020204" pitchFamily="34" charset="0"/>
-                <a:cs typeface="Helvetica" panose="020B0604020202020204" pitchFamily="34" charset="0"/>
-              </a:rPr>
-              <a:t> </a:t>
-            </a:r>
-            <a:r>
-              <a:rPr lang="en-US" sz="1200" dirty="0" smtClean="0">
-                <a:latin typeface="Helvetica" panose="020B0604020202020204" pitchFamily="34" charset="0"/>
-                <a:cs typeface="Helvetica" panose="020B0604020202020204" pitchFamily="34" charset="0"/>
-              </a:rPr>
-              <a:t>M</a:t>
-            </a:r>
-            <a:r>
-              <a:rPr lang="en-US" sz="1200" dirty="0">
-                <a:latin typeface="Helvetica" panose="020B0604020202020204" pitchFamily="34" charset="0"/>
-                <a:cs typeface="Helvetica" panose="020B0604020202020204" pitchFamily="34" charset="0"/>
-              </a:rPr>
-              <a:t>. </a:t>
-            </a:r>
-            <a:r>
-              <a:rPr lang="en-US" sz="1200" dirty="0" err="1">
-                <a:latin typeface="Helvetica" panose="020B0604020202020204" pitchFamily="34" charset="0"/>
-                <a:cs typeface="Helvetica" panose="020B0604020202020204" pitchFamily="34" charset="0"/>
-              </a:rPr>
-              <a:t>Ugur</a:t>
-            </a:r>
-            <a:r>
-              <a:rPr lang="en-US" sz="1200" dirty="0">
-                <a:latin typeface="Helvetica" panose="020B0604020202020204" pitchFamily="34" charset="0"/>
-                <a:cs typeface="Helvetica" panose="020B0604020202020204" pitchFamily="34" charset="0"/>
-              </a:rPr>
-              <a:t> and O. Keysan, “DC link capacitor optimization for integrated modular motor drives,” </a:t>
-            </a:r>
-            <a:r>
-              <a:rPr lang="en-US" sz="1200" i="1" dirty="0">
-                <a:latin typeface="Helvetica" panose="020B0604020202020204" pitchFamily="34" charset="0"/>
-                <a:cs typeface="Helvetica" panose="020B0604020202020204" pitchFamily="34" charset="0"/>
-              </a:rPr>
-              <a:t>2017 IEEE 26th Int. </a:t>
-            </a:r>
-            <a:r>
-              <a:rPr lang="en-US" sz="1200" i="1" dirty="0" err="1">
-                <a:latin typeface="Helvetica" panose="020B0604020202020204" pitchFamily="34" charset="0"/>
-                <a:cs typeface="Helvetica" panose="020B0604020202020204" pitchFamily="34" charset="0"/>
-              </a:rPr>
-              <a:t>Symp</a:t>
-            </a:r>
-            <a:r>
-              <a:rPr lang="en-US" sz="1200" i="1" dirty="0">
-                <a:latin typeface="Helvetica" panose="020B0604020202020204" pitchFamily="34" charset="0"/>
-                <a:cs typeface="Helvetica" panose="020B0604020202020204" pitchFamily="34" charset="0"/>
-              </a:rPr>
-              <a:t>. Ind. Electron.</a:t>
-            </a:r>
-            <a:r>
-              <a:rPr lang="en-US" sz="1200" dirty="0">
-                <a:latin typeface="Helvetica" panose="020B0604020202020204" pitchFamily="34" charset="0"/>
-                <a:cs typeface="Helvetica" panose="020B0604020202020204" pitchFamily="34" charset="0"/>
-              </a:rPr>
-              <a:t>, vol. </a:t>
-            </a:r>
-            <a:r>
-              <a:rPr lang="en-US" sz="1200" dirty="0" err="1">
-                <a:latin typeface="Helvetica" panose="020B0604020202020204" pitchFamily="34" charset="0"/>
-                <a:cs typeface="Helvetica" panose="020B0604020202020204" pitchFamily="34" charset="0"/>
-              </a:rPr>
-              <a:t>i</a:t>
-            </a:r>
-            <a:r>
-              <a:rPr lang="en-US" sz="1200" dirty="0">
-                <a:latin typeface="Helvetica" panose="020B0604020202020204" pitchFamily="34" charset="0"/>
-                <a:cs typeface="Helvetica" panose="020B0604020202020204" pitchFamily="34" charset="0"/>
-              </a:rPr>
-              <a:t>, pp. 263–270, 2017</a:t>
-            </a:r>
-            <a:r>
-              <a:rPr lang="en-US" sz="1200" dirty="0" smtClean="0">
-                <a:latin typeface="Helvetica" panose="020B0604020202020204" pitchFamily="34" charset="0"/>
-                <a:cs typeface="Helvetica" panose="020B0604020202020204" pitchFamily="34" charset="0"/>
-              </a:rPr>
-              <a:t>.</a:t>
-            </a:r>
-            <a:endParaRPr lang="tr-TR" sz="1200" dirty="0" smtClean="0">
-              <a:latin typeface="Helvetica" panose="020B0604020202020204" pitchFamily="34" charset="0"/>
-              <a:cs typeface="Helvetica" panose="020B0604020202020204" pitchFamily="34" charset="0"/>
-            </a:endParaRPr>
-          </a:p>
-          <a:p>
-            <a:endParaRPr lang="en-US" sz="1200" dirty="0">
-              <a:latin typeface="Helvetica" panose="020B0604020202020204" pitchFamily="34" charset="0"/>
-              <a:cs typeface="Helvetica" panose="020B0604020202020204" pitchFamily="34" charset="0"/>
-            </a:endParaRPr>
-          </a:p>
-          <a:p>
-            <a:r>
-              <a:rPr lang="en-US" sz="1200" dirty="0">
-                <a:latin typeface="Helvetica" panose="020B0604020202020204" pitchFamily="34" charset="0"/>
-                <a:cs typeface="Helvetica" panose="020B0604020202020204" pitchFamily="34" charset="0"/>
-              </a:rPr>
-              <a:t>[</a:t>
-            </a:r>
-            <a:r>
-              <a:rPr lang="en-US" sz="1200" dirty="0" smtClean="0">
-                <a:latin typeface="Helvetica" panose="020B0604020202020204" pitchFamily="34" charset="0"/>
-                <a:cs typeface="Helvetica" panose="020B0604020202020204" pitchFamily="34" charset="0"/>
-              </a:rPr>
-              <a:t>5]</a:t>
-            </a:r>
-            <a:r>
-              <a:rPr lang="tr-TR" sz="1200" dirty="0" smtClean="0">
-                <a:latin typeface="Helvetica" panose="020B0604020202020204" pitchFamily="34" charset="0"/>
-                <a:cs typeface="Helvetica" panose="020B0604020202020204" pitchFamily="34" charset="0"/>
-              </a:rPr>
-              <a:t> </a:t>
-            </a:r>
-            <a:r>
-              <a:rPr lang="en-US" sz="1200" dirty="0" smtClean="0">
-                <a:latin typeface="Helvetica" panose="020B0604020202020204" pitchFamily="34" charset="0"/>
-                <a:cs typeface="Helvetica" panose="020B0604020202020204" pitchFamily="34" charset="0"/>
-              </a:rPr>
-              <a:t>A</a:t>
-            </a:r>
-            <a:r>
-              <a:rPr lang="en-US" sz="1200" dirty="0">
-                <a:latin typeface="Helvetica" panose="020B0604020202020204" pitchFamily="34" charset="0"/>
-                <a:cs typeface="Helvetica" panose="020B0604020202020204" pitchFamily="34" charset="0"/>
-              </a:rPr>
-              <a:t>. </a:t>
-            </a:r>
-            <a:r>
-              <a:rPr lang="en-US" sz="1200" dirty="0" err="1">
-                <a:latin typeface="Helvetica" panose="020B0604020202020204" pitchFamily="34" charset="0"/>
-                <a:cs typeface="Helvetica" panose="020B0604020202020204" pitchFamily="34" charset="0"/>
-              </a:rPr>
-              <a:t>Shea</a:t>
-            </a:r>
-            <a:r>
-              <a:rPr lang="en-US" sz="1200" dirty="0">
-                <a:latin typeface="Helvetica" panose="020B0604020202020204" pitchFamily="34" charset="0"/>
-                <a:cs typeface="Helvetica" panose="020B0604020202020204" pitchFamily="34" charset="0"/>
-              </a:rPr>
-              <a:t> and T. M. </a:t>
-            </a:r>
-            <a:r>
-              <a:rPr lang="en-US" sz="1200" dirty="0" err="1">
-                <a:latin typeface="Helvetica" panose="020B0604020202020204" pitchFamily="34" charset="0"/>
-                <a:cs typeface="Helvetica" panose="020B0604020202020204" pitchFamily="34" charset="0"/>
-              </a:rPr>
-              <a:t>Jahns</a:t>
-            </a:r>
-            <a:r>
-              <a:rPr lang="en-US" sz="1200" dirty="0">
-                <a:latin typeface="Helvetica" panose="020B0604020202020204" pitchFamily="34" charset="0"/>
-                <a:cs typeface="Helvetica" panose="020B0604020202020204" pitchFamily="34" charset="0"/>
-              </a:rPr>
-              <a:t>, “Hardware integration for an integrated modular motor drive including distributed control,” in </a:t>
-            </a:r>
-            <a:r>
-              <a:rPr lang="en-US" sz="1200" i="1" dirty="0">
-                <a:latin typeface="Helvetica" panose="020B0604020202020204" pitchFamily="34" charset="0"/>
-                <a:cs typeface="Helvetica" panose="020B0604020202020204" pitchFamily="34" charset="0"/>
-              </a:rPr>
-              <a:t>2014 IEEE Energy Conversion Congress and Exposition (ECCE)</a:t>
-            </a:r>
-            <a:r>
-              <a:rPr lang="en-US" sz="1200" dirty="0">
-                <a:latin typeface="Helvetica" panose="020B0604020202020204" pitchFamily="34" charset="0"/>
-                <a:cs typeface="Helvetica" panose="020B0604020202020204" pitchFamily="34" charset="0"/>
-              </a:rPr>
-              <a:t>, 2014, pp. 4881–4887</a:t>
-            </a:r>
-            <a:r>
-              <a:rPr lang="en-US" sz="1200" dirty="0" smtClean="0">
-                <a:latin typeface="Helvetica" panose="020B0604020202020204" pitchFamily="34" charset="0"/>
-                <a:cs typeface="Helvetica" panose="020B0604020202020204" pitchFamily="34" charset="0"/>
-              </a:rPr>
-              <a:t>.</a:t>
-            </a:r>
-            <a:endParaRPr lang="tr-TR" sz="1200" dirty="0" smtClean="0">
-              <a:latin typeface="Helvetica" panose="020B0604020202020204" pitchFamily="34" charset="0"/>
-              <a:cs typeface="Helvetica" panose="020B0604020202020204" pitchFamily="34" charset="0"/>
-            </a:endParaRPr>
-          </a:p>
-          <a:p>
-            <a:endParaRPr lang="en-US" sz="1200" dirty="0">
-              <a:latin typeface="Helvetica" panose="020B0604020202020204" pitchFamily="34" charset="0"/>
-              <a:cs typeface="Helvetica" panose="020B0604020202020204" pitchFamily="34" charset="0"/>
-            </a:endParaRPr>
-          </a:p>
-          <a:p>
-            <a:r>
-              <a:rPr lang="en-US" sz="1200" dirty="0">
-                <a:latin typeface="Helvetica" panose="020B0604020202020204" pitchFamily="34" charset="0"/>
-                <a:cs typeface="Helvetica" panose="020B0604020202020204" pitchFamily="34" charset="0"/>
-              </a:rPr>
-              <a:t>[</a:t>
-            </a:r>
-            <a:r>
-              <a:rPr lang="en-US" sz="1200" dirty="0" smtClean="0">
-                <a:latin typeface="Helvetica" panose="020B0604020202020204" pitchFamily="34" charset="0"/>
-                <a:cs typeface="Helvetica" panose="020B0604020202020204" pitchFamily="34" charset="0"/>
-              </a:rPr>
-              <a:t>6]</a:t>
-            </a:r>
-            <a:r>
-              <a:rPr lang="tr-TR" sz="1200" dirty="0" smtClean="0">
-                <a:latin typeface="Helvetica" panose="020B0604020202020204" pitchFamily="34" charset="0"/>
-                <a:cs typeface="Helvetica" panose="020B0604020202020204" pitchFamily="34" charset="0"/>
-              </a:rPr>
-              <a:t> </a:t>
-            </a:r>
-            <a:r>
-              <a:rPr lang="en-US" sz="1200" dirty="0" smtClean="0">
-                <a:latin typeface="Helvetica" panose="020B0604020202020204" pitchFamily="34" charset="0"/>
-                <a:cs typeface="Helvetica" panose="020B0604020202020204" pitchFamily="34" charset="0"/>
-              </a:rPr>
-              <a:t>N</a:t>
-            </a:r>
-            <a:r>
-              <a:rPr lang="en-US" sz="1200" dirty="0">
-                <a:latin typeface="Helvetica" panose="020B0604020202020204" pitchFamily="34" charset="0"/>
-                <a:cs typeface="Helvetica" panose="020B0604020202020204" pitchFamily="34" charset="0"/>
-              </a:rPr>
-              <a:t>. </a:t>
-            </a:r>
-            <a:r>
-              <a:rPr lang="en-US" sz="1200" dirty="0" err="1">
-                <a:latin typeface="Helvetica" panose="020B0604020202020204" pitchFamily="34" charset="0"/>
-                <a:cs typeface="Helvetica" panose="020B0604020202020204" pitchFamily="34" charset="0"/>
-              </a:rPr>
-              <a:t>Bekka</a:t>
-            </a:r>
-            <a:r>
-              <a:rPr lang="en-US" sz="1200" dirty="0">
-                <a:latin typeface="Helvetica" panose="020B0604020202020204" pitchFamily="34" charset="0"/>
-                <a:cs typeface="Helvetica" panose="020B0604020202020204" pitchFamily="34" charset="0"/>
-              </a:rPr>
-              <a:t>, M. E. H. </a:t>
-            </a:r>
-            <a:r>
-              <a:rPr lang="en-US" sz="1200" dirty="0" err="1">
-                <a:latin typeface="Helvetica" panose="020B0604020202020204" pitchFamily="34" charset="0"/>
-                <a:cs typeface="Helvetica" panose="020B0604020202020204" pitchFamily="34" charset="0"/>
-              </a:rPr>
-              <a:t>Zaim</a:t>
-            </a:r>
-            <a:r>
-              <a:rPr lang="en-US" sz="1200" dirty="0">
-                <a:latin typeface="Helvetica" panose="020B0604020202020204" pitchFamily="34" charset="0"/>
-                <a:cs typeface="Helvetica" panose="020B0604020202020204" pitchFamily="34" charset="0"/>
-              </a:rPr>
-              <a:t>, N. Bernard, and D. Trichet, “A Novel Methodology for Optimal Design of Fractional Slot with Concentrated Windings,” </a:t>
-            </a:r>
-            <a:r>
-              <a:rPr lang="en-US" sz="1200" i="1" dirty="0">
-                <a:latin typeface="Helvetica" panose="020B0604020202020204" pitchFamily="34" charset="0"/>
-                <a:cs typeface="Helvetica" panose="020B0604020202020204" pitchFamily="34" charset="0"/>
-              </a:rPr>
-              <a:t>IEEE Trans. Energy Convers.</a:t>
-            </a:r>
-            <a:r>
-              <a:rPr lang="en-US" sz="1200" dirty="0">
-                <a:latin typeface="Helvetica" panose="020B0604020202020204" pitchFamily="34" charset="0"/>
-                <a:cs typeface="Helvetica" panose="020B0604020202020204" pitchFamily="34" charset="0"/>
-              </a:rPr>
-              <a:t>, vol. 31, no. 3, pp. 1153–1160, 2016</a:t>
-            </a:r>
-            <a:r>
-              <a:rPr lang="en-US" sz="1200" dirty="0" smtClean="0">
-                <a:latin typeface="Helvetica" panose="020B0604020202020204" pitchFamily="34" charset="0"/>
-                <a:cs typeface="Helvetica" panose="020B0604020202020204" pitchFamily="34" charset="0"/>
-              </a:rPr>
-              <a:t>.</a:t>
-            </a:r>
-            <a:endParaRPr lang="tr-TR" sz="1200" dirty="0" smtClean="0">
-              <a:latin typeface="Helvetica" panose="020B0604020202020204" pitchFamily="34" charset="0"/>
-              <a:cs typeface="Helvetica" panose="020B0604020202020204" pitchFamily="34" charset="0"/>
-            </a:endParaRPr>
-          </a:p>
-          <a:p>
-            <a:endParaRPr lang="en-US" sz="1200" dirty="0">
-              <a:latin typeface="Helvetica" panose="020B0604020202020204" pitchFamily="34" charset="0"/>
-              <a:cs typeface="Helvetica" panose="020B0604020202020204" pitchFamily="34" charset="0"/>
-            </a:endParaRPr>
-          </a:p>
-          <a:p>
-            <a:r>
-              <a:rPr lang="en-US" sz="1200" dirty="0">
-                <a:latin typeface="Helvetica" panose="020B0604020202020204" pitchFamily="34" charset="0"/>
-                <a:cs typeface="Helvetica" panose="020B0604020202020204" pitchFamily="34" charset="0"/>
-              </a:rPr>
-              <a:t>[</a:t>
-            </a:r>
-            <a:r>
-              <a:rPr lang="en-US" sz="1200" dirty="0" smtClean="0">
-                <a:latin typeface="Helvetica" panose="020B0604020202020204" pitchFamily="34" charset="0"/>
-                <a:cs typeface="Helvetica" panose="020B0604020202020204" pitchFamily="34" charset="0"/>
-              </a:rPr>
-              <a:t>7]</a:t>
-            </a:r>
-            <a:r>
-              <a:rPr lang="tr-TR" sz="1200" dirty="0" smtClean="0">
-                <a:latin typeface="Helvetica" panose="020B0604020202020204" pitchFamily="34" charset="0"/>
-                <a:cs typeface="Helvetica" panose="020B0604020202020204" pitchFamily="34" charset="0"/>
-              </a:rPr>
-              <a:t> </a:t>
-            </a:r>
-            <a:r>
-              <a:rPr lang="en-US" sz="1200" dirty="0" smtClean="0">
-                <a:latin typeface="Helvetica" panose="020B0604020202020204" pitchFamily="34" charset="0"/>
-                <a:cs typeface="Helvetica" panose="020B0604020202020204" pitchFamily="34" charset="0"/>
-              </a:rPr>
-              <a:t>GaN </a:t>
-            </a:r>
-            <a:r>
-              <a:rPr lang="en-US" sz="1200" dirty="0">
-                <a:latin typeface="Helvetica" panose="020B0604020202020204" pitchFamily="34" charset="0"/>
-                <a:cs typeface="Helvetica" panose="020B0604020202020204" pitchFamily="34" charset="0"/>
-              </a:rPr>
-              <a:t>Systems, “GaN Systems.” [Online]. Available: http://www.gansystems.com/. [Accessed: 15-Jan-2018</a:t>
-            </a:r>
-            <a:r>
-              <a:rPr lang="en-US" sz="1200" dirty="0" smtClean="0">
-                <a:latin typeface="Helvetica" panose="020B0604020202020204" pitchFamily="34" charset="0"/>
-                <a:cs typeface="Helvetica" panose="020B0604020202020204" pitchFamily="34" charset="0"/>
-              </a:rPr>
-              <a:t>].</a:t>
-            </a:r>
-            <a:endParaRPr lang="tr-TR" sz="1200" dirty="0" smtClean="0">
-              <a:latin typeface="Helvetica" panose="020B0604020202020204" pitchFamily="34" charset="0"/>
-              <a:cs typeface="Helvetica" panose="020B0604020202020204" pitchFamily="34" charset="0"/>
-            </a:endParaRPr>
-          </a:p>
-          <a:p>
-            <a:endParaRPr lang="en-US" sz="1200" dirty="0">
-              <a:latin typeface="Helvetica" panose="020B0604020202020204" pitchFamily="34" charset="0"/>
-              <a:cs typeface="Helvetica" panose="020B0604020202020204" pitchFamily="34" charset="0"/>
-            </a:endParaRPr>
-          </a:p>
-          <a:p>
-            <a:r>
-              <a:rPr lang="en-US" sz="1200" dirty="0">
-                <a:latin typeface="Helvetica" panose="020B0604020202020204" pitchFamily="34" charset="0"/>
-                <a:cs typeface="Helvetica" panose="020B0604020202020204" pitchFamily="34" charset="0"/>
-              </a:rPr>
-              <a:t>[</a:t>
-            </a:r>
-            <a:r>
-              <a:rPr lang="en-US" sz="1200" dirty="0" smtClean="0">
-                <a:latin typeface="Helvetica" panose="020B0604020202020204" pitchFamily="34" charset="0"/>
-                <a:cs typeface="Helvetica" panose="020B0604020202020204" pitchFamily="34" charset="0"/>
-              </a:rPr>
-              <a:t>8]</a:t>
-            </a:r>
-            <a:r>
-              <a:rPr lang="tr-TR" sz="1200" dirty="0" smtClean="0">
-                <a:latin typeface="Helvetica" panose="020B0604020202020204" pitchFamily="34" charset="0"/>
-                <a:cs typeface="Helvetica" panose="020B0604020202020204" pitchFamily="34" charset="0"/>
-              </a:rPr>
-              <a:t> </a:t>
-            </a:r>
-            <a:r>
-              <a:rPr lang="en-US" sz="1200" dirty="0" smtClean="0">
-                <a:latin typeface="Helvetica" panose="020B0604020202020204" pitchFamily="34" charset="0"/>
-                <a:cs typeface="Helvetica" panose="020B0604020202020204" pitchFamily="34" charset="0"/>
-              </a:rPr>
-              <a:t>TDK</a:t>
-            </a:r>
-            <a:r>
-              <a:rPr lang="en-US" sz="1200" dirty="0">
-                <a:latin typeface="Helvetica" panose="020B0604020202020204" pitchFamily="34" charset="0"/>
-                <a:cs typeface="Helvetica" panose="020B0604020202020204" pitchFamily="34" charset="0"/>
-              </a:rPr>
-              <a:t>, “Film Capacitors, Metallized Polypropylene Film Capacitors (MKP) - B32674...B32674 Datasheet,” no. May. 2015</a:t>
-            </a:r>
-            <a:r>
-              <a:rPr lang="en-US" sz="1200" dirty="0" smtClean="0">
-                <a:latin typeface="Helvetica" panose="020B0604020202020204" pitchFamily="34" charset="0"/>
-                <a:cs typeface="Helvetica" panose="020B0604020202020204" pitchFamily="34" charset="0"/>
-              </a:rPr>
-              <a:t>.</a:t>
-            </a:r>
-            <a:endParaRPr lang="tr-TR" sz="1200" dirty="0" smtClean="0">
-              <a:latin typeface="Helvetica" panose="020B0604020202020204" pitchFamily="34" charset="0"/>
-              <a:cs typeface="Helvetica" panose="020B0604020202020204" pitchFamily="34" charset="0"/>
-            </a:endParaRPr>
-          </a:p>
-          <a:p>
-            <a:endParaRPr lang="en-US" sz="1200" dirty="0">
-              <a:latin typeface="Helvetica" panose="020B0604020202020204" pitchFamily="34" charset="0"/>
-              <a:cs typeface="Helvetica" panose="020B0604020202020204" pitchFamily="34" charset="0"/>
-            </a:endParaRPr>
-          </a:p>
-          <a:p>
-            <a:r>
-              <a:rPr lang="en-US" sz="1200" dirty="0">
-                <a:latin typeface="Helvetica" panose="020B0604020202020204" pitchFamily="34" charset="0"/>
-                <a:cs typeface="Helvetica" panose="020B0604020202020204" pitchFamily="34" charset="0"/>
-              </a:rPr>
-              <a:t>[</a:t>
-            </a:r>
-            <a:r>
-              <a:rPr lang="en-US" sz="1200" dirty="0" smtClean="0">
-                <a:latin typeface="Helvetica" panose="020B0604020202020204" pitchFamily="34" charset="0"/>
-                <a:cs typeface="Helvetica" panose="020B0604020202020204" pitchFamily="34" charset="0"/>
-              </a:rPr>
-              <a:t>9]</a:t>
-            </a:r>
-            <a:r>
-              <a:rPr lang="tr-TR" sz="1200" dirty="0" smtClean="0">
-                <a:latin typeface="Helvetica" panose="020B0604020202020204" pitchFamily="34" charset="0"/>
-                <a:cs typeface="Helvetica" panose="020B0604020202020204" pitchFamily="34" charset="0"/>
-              </a:rPr>
-              <a:t> </a:t>
-            </a:r>
-            <a:r>
-              <a:rPr lang="en-US" sz="1200" dirty="0" smtClean="0">
-                <a:latin typeface="Helvetica" panose="020B0604020202020204" pitchFamily="34" charset="0"/>
-                <a:cs typeface="Helvetica" panose="020B0604020202020204" pitchFamily="34" charset="0"/>
-              </a:rPr>
-              <a:t>R</a:t>
-            </a:r>
-            <a:r>
-              <a:rPr lang="en-US" sz="1200" dirty="0">
-                <a:latin typeface="Helvetica" panose="020B0604020202020204" pitchFamily="34" charset="0"/>
-                <a:cs typeface="Helvetica" panose="020B0604020202020204" pitchFamily="34" charset="0"/>
-              </a:rPr>
-              <a:t>. E. Simons, “Estimating Parallel Plate-Fin Heat Sink Thermal Resistance.” [Online]. Available: https://www.electronics-cooling.com/2003/02/estimating-parallel-plate-fin-heat-sink-thermal-resistance</a:t>
-            </a:r>
-            <a:r>
-              <a:rPr lang="en-US" sz="1200" dirty="0" smtClean="0">
-                <a:latin typeface="Helvetica" panose="020B0604020202020204" pitchFamily="34" charset="0"/>
-                <a:cs typeface="Helvetica" panose="020B0604020202020204" pitchFamily="34" charset="0"/>
-              </a:rPr>
-              <a:t>/.</a:t>
-            </a:r>
-            <a:endParaRPr lang="en-US" sz="1200" dirty="0">
-              <a:latin typeface="Helvetica" panose="020B0604020202020204" pitchFamily="34" charset="0"/>
-              <a:cs typeface="Helvetica" panose="020B0604020202020204" pitchFamily="34" charset="0"/>
-            </a:endParaRPr>
-          </a:p>
         </p:txBody>
       </p:sp>
+      <p:pic>
+        <p:nvPicPr>
+          <p:cNvPr id="4" name="Picture 3"/>
+          <p:cNvPicPr>
+            <a:picLocks noChangeAspect="1"/>
+          </p:cNvPicPr>
+          <p:nvPr/>
+        </p:nvPicPr>
+        <p:blipFill>
+          <a:blip r:embed="rId5" cstate="print">
+            <a:extLst>
+              <a:ext uri="{28A0092B-C50C-407E-A947-70E740481C1C}">
+                <a14:useLocalDpi xmlns:a14="http://schemas.microsoft.com/office/drawing/2010/main" val="0"/>
+              </a:ext>
+            </a:extLst>
+          </a:blip>
+          <a:stretch>
+            <a:fillRect/>
+          </a:stretch>
+        </p:blipFill>
+        <p:spPr>
+          <a:xfrm>
+            <a:off x="3033358" y="2977145"/>
+            <a:ext cx="3962401" cy="2876812"/>
+          </a:xfrm>
+          <a:prstGeom prst="rect">
+            <a:avLst/>
+          </a:prstGeom>
+        </p:spPr>
+      </p:pic>
     </p:spTree>
     <p:extLst>
       <p:ext uri="{BB962C8B-B14F-4D97-AF65-F5344CB8AC3E}">
-        <p14:creationId xmlns:p14="http://schemas.microsoft.com/office/powerpoint/2010/main" val="198061606"/>
+        <p14:creationId xmlns:p14="http://schemas.microsoft.com/office/powerpoint/2010/main" val="1687259749"/>
       </p:ext>
     </p:extLst>
   </p:cSld>
@@ -10724,7 +10001,204 @@
   <p:timing>
     <p:tnLst>
       <p:par>
-        <p:cTn id="1" dur="indefinite" restart="never" nodeType="tmRoot"/>
+        <p:cTn id="1" dur="indefinite" restart="never" nodeType="tmRoot">
+          <p:childTnLst>
+            <p:seq concurrent="1" nextAc="seek">
+              <p:cTn id="2" dur="indefinite" nodeType="mainSeq">
+                <p:childTnLst>
+                  <p:par>
+                    <p:cTn id="3" fill="hold">
+                      <p:stCondLst>
+                        <p:cond delay="indefinite"/>
+                      </p:stCondLst>
+                      <p:childTnLst>
+                        <p:par>
+                          <p:cTn id="4" fill="hold">
+                            <p:stCondLst>
+                              <p:cond delay="0"/>
+                            </p:stCondLst>
+                            <p:childTnLst>
+                              <p:par>
+                                <p:cTn id="5" presetID="1" presetClass="entr" presetSubtype="0" fill="hold" nodeType="clickEffect">
+                                  <p:stCondLst>
+                                    <p:cond delay="0"/>
+                                  </p:stCondLst>
+                                  <p:childTnLst>
+                                    <p:set>
+                                      <p:cBhvr>
+                                        <p:cTn id="6" dur="1" fill="hold">
+                                          <p:stCondLst>
+                                            <p:cond delay="0"/>
+                                          </p:stCondLst>
+                                        </p:cTn>
+                                        <p:tgtEl>
+                                          <p:spTgt spid="24">
+                                            <p:txEl>
+                                              <p:pRg st="0" end="0"/>
+                                            </p:txEl>
+                                          </p:spTgt>
+                                        </p:tgtEl>
+                                        <p:attrNameLst>
+                                          <p:attrName>style.visibility</p:attrName>
+                                        </p:attrNameLst>
+                                      </p:cBhvr>
+                                      <p:to>
+                                        <p:strVal val="visible"/>
+                                      </p:to>
+                                    </p:set>
+                                  </p:childTnLst>
+                                </p:cTn>
+                              </p:par>
+                            </p:childTnLst>
+                          </p:cTn>
+                        </p:par>
+                      </p:childTnLst>
+                    </p:cTn>
+                  </p:par>
+                  <p:par>
+                    <p:cTn id="7" fill="hold">
+                      <p:stCondLst>
+                        <p:cond delay="indefinite"/>
+                      </p:stCondLst>
+                      <p:childTnLst>
+                        <p:par>
+                          <p:cTn id="8" fill="hold">
+                            <p:stCondLst>
+                              <p:cond delay="0"/>
+                            </p:stCondLst>
+                            <p:childTnLst>
+                              <p:par>
+                                <p:cTn id="9" presetID="1" presetClass="entr" presetSubtype="0" fill="hold" nodeType="clickEffect">
+                                  <p:stCondLst>
+                                    <p:cond delay="0"/>
+                                  </p:stCondLst>
+                                  <p:childTnLst>
+                                    <p:set>
+                                      <p:cBhvr>
+                                        <p:cTn id="10" dur="1" fill="hold">
+                                          <p:stCondLst>
+                                            <p:cond delay="0"/>
+                                          </p:stCondLst>
+                                        </p:cTn>
+                                        <p:tgtEl>
+                                          <p:spTgt spid="24">
+                                            <p:txEl>
+                                              <p:pRg st="1" end="1"/>
+                                            </p:txEl>
+                                          </p:spTgt>
+                                        </p:tgtEl>
+                                        <p:attrNameLst>
+                                          <p:attrName>style.visibility</p:attrName>
+                                        </p:attrNameLst>
+                                      </p:cBhvr>
+                                      <p:to>
+                                        <p:strVal val="visible"/>
+                                      </p:to>
+                                    </p:set>
+                                  </p:childTnLst>
+                                </p:cTn>
+                              </p:par>
+                            </p:childTnLst>
+                          </p:cTn>
+                        </p:par>
+                      </p:childTnLst>
+                    </p:cTn>
+                  </p:par>
+                  <p:par>
+                    <p:cTn id="11" fill="hold">
+                      <p:stCondLst>
+                        <p:cond delay="indefinite"/>
+                      </p:stCondLst>
+                      <p:childTnLst>
+                        <p:par>
+                          <p:cTn id="12" fill="hold">
+                            <p:stCondLst>
+                              <p:cond delay="0"/>
+                            </p:stCondLst>
+                            <p:childTnLst>
+                              <p:par>
+                                <p:cTn id="13" presetID="1" presetClass="entr" presetSubtype="0" fill="hold" nodeType="clickEffect">
+                                  <p:stCondLst>
+                                    <p:cond delay="0"/>
+                                  </p:stCondLst>
+                                  <p:childTnLst>
+                                    <p:set>
+                                      <p:cBhvr>
+                                        <p:cTn id="14" dur="1" fill="hold">
+                                          <p:stCondLst>
+                                            <p:cond delay="0"/>
+                                          </p:stCondLst>
+                                        </p:cTn>
+                                        <p:tgtEl>
+                                          <p:spTgt spid="24">
+                                            <p:txEl>
+                                              <p:pRg st="2" end="2"/>
+                                            </p:txEl>
+                                          </p:spTgt>
+                                        </p:tgtEl>
+                                        <p:attrNameLst>
+                                          <p:attrName>style.visibility</p:attrName>
+                                        </p:attrNameLst>
+                                      </p:cBhvr>
+                                      <p:to>
+                                        <p:strVal val="visible"/>
+                                      </p:to>
+                                    </p:set>
+                                  </p:childTnLst>
+                                </p:cTn>
+                              </p:par>
+                              <p:par>
+                                <p:cTn id="15" presetID="1" presetClass="entr" presetSubtype="0" fill="hold" nodeType="withEffect">
+                                  <p:stCondLst>
+                                    <p:cond delay="0"/>
+                                  </p:stCondLst>
+                                  <p:childTnLst>
+                                    <p:set>
+                                      <p:cBhvr>
+                                        <p:cTn id="16" dur="1" fill="hold">
+                                          <p:stCondLst>
+                                            <p:cond delay="0"/>
+                                          </p:stCondLst>
+                                        </p:cTn>
+                                        <p:tgtEl>
+                                          <p:spTgt spid="4"/>
+                                        </p:tgtEl>
+                                        <p:attrNameLst>
+                                          <p:attrName>style.visibility</p:attrName>
+                                        </p:attrNameLst>
+                                      </p:cBhvr>
+                                      <p:to>
+                                        <p:strVal val="visible"/>
+                                      </p:to>
+                                    </p:set>
+                                  </p:childTnLst>
+                                </p:cTn>
+                              </p:par>
+                            </p:childTnLst>
+                          </p:cTn>
+                        </p:par>
+                      </p:childTnLst>
+                    </p:cTn>
+                  </p:par>
+                </p:childTnLst>
+              </p:cTn>
+              <p:prevCondLst>
+                <p:cond evt="onPrev" delay="0">
+                  <p:tgtEl>
+                    <p:sldTgt/>
+                  </p:tgtEl>
+                </p:cond>
+              </p:prevCondLst>
+              <p:nextCondLst>
+                <p:cond evt="onNext" delay="0">
+                  <p:tgtEl>
+                    <p:sldTgt/>
+                  </p:tgtEl>
+                </p:cond>
+              </p:nextCondLst>
+            </p:seq>
+          </p:childTnLst>
+        </p:cTn>
       </p:par>
     </p:tnLst>
   </p:timing>
@@ -10847,6 +10321,43 @@
           </a:fontRef>
         </p:style>
       </p:cxnSp>
+      <p:sp>
+        <p:nvSpPr>
+          <p:cNvPr id="13" name="TextBox 12"/>
+          <p:cNvSpPr txBox="1"/>
+          <p:nvPr/>
+        </p:nvSpPr>
+        <p:spPr>
+          <a:xfrm>
+            <a:off x="1386291" y="224135"/>
+            <a:ext cx="7315200" cy="553998"/>
+          </a:xfrm>
+          <a:prstGeom prst="rect">
+            <a:avLst/>
+          </a:prstGeom>
+          <a:noFill/>
+        </p:spPr>
+        <p:txBody>
+          <a:bodyPr wrap="square" rtlCol="0">
+            <a:spAutoFit/>
+          </a:bodyPr>
+          <a:lstStyle/>
+          <a:p>
+            <a:pPr algn="ctr"/>
+            <a:r>
+              <a:rPr lang="tr-TR" sz="3000" dirty="0" err="1" smtClean="0">
+                <a:latin typeface="Times New Roman" panose="02020603050405020304" pitchFamily="18" charset="0"/>
+                <a:cs typeface="Times New Roman" panose="02020603050405020304" pitchFamily="18" charset="0"/>
+              </a:rPr>
+              <a:t>References</a:t>
+            </a:r>
+            <a:endParaRPr lang="en-US" sz="3000" dirty="0">
+              <a:latin typeface="Times New Roman" panose="02020603050405020304" pitchFamily="18" charset="0"/>
+              <a:cs typeface="Times New Roman" panose="02020603050405020304" pitchFamily="18" charset="0"/>
+            </a:endParaRPr>
+          </a:p>
+        </p:txBody>
+      </p:sp>
       <p:cxnSp>
         <p:nvCxnSpPr>
           <p:cNvPr id="15" name="Straight Connector 14"/>
@@ -10901,6 +10412,1229 @@
               <a:rPr lang="en-US" smtClean="0"/>
               <a:pPr/>
               <a:t>15</a:t>
+            </a:fld>
+            <a:endParaRPr lang="en-US" dirty="0"/>
+          </a:p>
+        </p:txBody>
+      </p:sp>
+      <p:pic>
+        <p:nvPicPr>
+          <p:cNvPr id="12" name="Picture 2" descr="C:\Users\Mesut\Desktop\aselsan sunum\aselsan sunum 10 ekim\aselsan sunum\cezmi bey\ODTU.png"/>
+          <p:cNvPicPr>
+            <a:picLocks noChangeAspect="1" noChangeArrowheads="1"/>
+          </p:cNvPicPr>
+          <p:nvPr/>
+        </p:nvPicPr>
+        <p:blipFill>
+          <a:blip r:embed="rId3" cstate="print">
+            <a:extLst>
+              <a:ext uri="{28A0092B-C50C-407E-A947-70E740481C1C}">
+                <a14:useLocalDpi xmlns:a14="http://schemas.microsoft.com/office/drawing/2010/main" val="0"/>
+              </a:ext>
+            </a:extLst>
+          </a:blip>
+          <a:srcRect/>
+          <a:stretch>
+            <a:fillRect/>
+          </a:stretch>
+        </p:blipFill>
+        <p:spPr bwMode="auto">
+          <a:xfrm>
+            <a:off x="116458" y="163788"/>
+            <a:ext cx="779026" cy="650016"/>
+          </a:xfrm>
+          <a:prstGeom prst="rect">
+            <a:avLst/>
+          </a:prstGeom>
+          <a:noFill/>
+          <a:extLst>
+            <a:ext uri="{909E8E84-426E-40DD-AFC4-6F175D3DCCD1}">
+              <a14:hiddenFill xmlns:a14="http://schemas.microsoft.com/office/drawing/2010/main">
+                <a:solidFill>
+                  <a:srgbClr val="FFFFFF"/>
+                </a:solidFill>
+              </a14:hiddenFill>
+            </a:ext>
+          </a:extLst>
+        </p:spPr>
+      </p:pic>
+      <p:pic>
+        <p:nvPicPr>
+          <p:cNvPr id="14" name="Picture 13"/>
+          <p:cNvPicPr>
+            <a:picLocks noChangeAspect="1"/>
+          </p:cNvPicPr>
+          <p:nvPr/>
+        </p:nvPicPr>
+        <p:blipFill rotWithShape="1">
+          <a:blip r:embed="rId4"/>
+          <a:srcRect t="1741" b="7727"/>
+          <a:stretch/>
+        </p:blipFill>
+        <p:spPr>
+          <a:xfrm rot="16200000">
+            <a:off x="-315548" y="5538698"/>
+            <a:ext cx="1643039" cy="1011942"/>
+          </a:xfrm>
+          <a:prstGeom prst="rect">
+            <a:avLst/>
+          </a:prstGeom>
+        </p:spPr>
+      </p:pic>
+      <p:sp>
+        <p:nvSpPr>
+          <p:cNvPr id="3" name="Rectangle 2"/>
+          <p:cNvSpPr>
+            <a:spLocks noChangeArrowheads="1"/>
+          </p:cNvSpPr>
+          <p:nvPr/>
+        </p:nvSpPr>
+        <p:spPr bwMode="auto">
+          <a:xfrm>
+            <a:off x="0" y="0"/>
+            <a:ext cx="9144000" cy="0"/>
+          </a:xfrm>
+          <a:prstGeom prst="rect">
+            <a:avLst/>
+          </a:prstGeom>
+          <a:noFill/>
+          <a:ln>
+            <a:noFill/>
+          </a:ln>
+          <a:effectLst/>
+          <a:extLst>
+            <a:ext uri="{909E8E84-426E-40DD-AFC4-6F175D3DCCD1}">
+              <a14:hiddenFill xmlns:a14="http://schemas.microsoft.com/office/drawing/2010/main">
+                <a:solidFill>
+                  <a:schemeClr val="accent1"/>
+                </a:solidFill>
+              </a14:hiddenFill>
+            </a:ext>
+            <a:ext uri="{91240B29-F687-4F45-9708-019B960494DF}">
+              <a14:hiddenLine xmlns:a14="http://schemas.microsoft.com/office/drawing/2010/main" w="9525">
+                <a:solidFill>
+                  <a:schemeClr val="tx1"/>
+                </a:solidFill>
+                <a:miter lim="800000"/>
+                <a:headEnd/>
+                <a:tailEnd/>
+              </a14:hiddenLine>
+            </a:ext>
+            <a:ext uri="{AF507438-7753-43E0-B8FC-AC1667EBCBE1}">
+              <a14:hiddenEffects xmlns:a14="http://schemas.microsoft.com/office/drawing/2010/main">
+                <a:effectLst>
+                  <a:outerShdw dist="35921" dir="2700000" algn="ctr" rotWithShape="0">
+                    <a:schemeClr val="bg2"/>
+                  </a:outerShdw>
+                </a:effectLst>
+              </a14:hiddenEffects>
+            </a:ext>
+          </a:extLst>
+        </p:spPr>
+        <p:txBody>
+          <a:bodyPr vert="horz" wrap="none" lIns="91440" tIns="45720" rIns="91440" bIns="45720" numCol="1" anchor="ctr" anchorCtr="0" compatLnSpc="1">
+            <a:prstTxWarp prst="textNoShape">
+              <a:avLst/>
+            </a:prstTxWarp>
+            <a:spAutoFit/>
+          </a:bodyPr>
+          <a:lstStyle/>
+          <a:p>
+            <a:endParaRPr lang="en-US"/>
+          </a:p>
+        </p:txBody>
+      </p:sp>
+      <p:sp>
+        <p:nvSpPr>
+          <p:cNvPr id="7" name="Rectangle 4"/>
+          <p:cNvSpPr>
+            <a:spLocks noChangeArrowheads="1"/>
+          </p:cNvSpPr>
+          <p:nvPr/>
+        </p:nvSpPr>
+        <p:spPr bwMode="auto">
+          <a:xfrm>
+            <a:off x="0" y="0"/>
+            <a:ext cx="9144000" cy="0"/>
+          </a:xfrm>
+          <a:prstGeom prst="rect">
+            <a:avLst/>
+          </a:prstGeom>
+          <a:noFill/>
+          <a:ln>
+            <a:noFill/>
+          </a:ln>
+          <a:effectLst/>
+          <a:extLst>
+            <a:ext uri="{909E8E84-426E-40DD-AFC4-6F175D3DCCD1}">
+              <a14:hiddenFill xmlns:a14="http://schemas.microsoft.com/office/drawing/2010/main">
+                <a:solidFill>
+                  <a:schemeClr val="accent1"/>
+                </a:solidFill>
+              </a14:hiddenFill>
+            </a:ext>
+            <a:ext uri="{91240B29-F687-4F45-9708-019B960494DF}">
+              <a14:hiddenLine xmlns:a14="http://schemas.microsoft.com/office/drawing/2010/main" w="9525">
+                <a:solidFill>
+                  <a:schemeClr val="tx1"/>
+                </a:solidFill>
+                <a:miter lim="800000"/>
+                <a:headEnd/>
+                <a:tailEnd/>
+              </a14:hiddenLine>
+            </a:ext>
+            <a:ext uri="{AF507438-7753-43E0-B8FC-AC1667EBCBE1}">
+              <a14:hiddenEffects xmlns:a14="http://schemas.microsoft.com/office/drawing/2010/main">
+                <a:effectLst>
+                  <a:outerShdw dist="35921" dir="2700000" algn="ctr" rotWithShape="0">
+                    <a:schemeClr val="bg2"/>
+                  </a:outerShdw>
+                </a:effectLst>
+              </a14:hiddenEffects>
+            </a:ext>
+          </a:extLst>
+        </p:spPr>
+        <p:txBody>
+          <a:bodyPr vert="horz" wrap="none" lIns="91440" tIns="45720" rIns="91440" bIns="45720" numCol="1" anchor="ctr" anchorCtr="0" compatLnSpc="1">
+            <a:prstTxWarp prst="textNoShape">
+              <a:avLst/>
+            </a:prstTxWarp>
+            <a:spAutoFit/>
+          </a:bodyPr>
+          <a:lstStyle/>
+          <a:p>
+            <a:endParaRPr lang="en-US"/>
+          </a:p>
+        </p:txBody>
+      </p:sp>
+      <p:sp>
+        <p:nvSpPr>
+          <p:cNvPr id="16" name="Rectangle 15"/>
+          <p:cNvSpPr/>
+          <p:nvPr/>
+        </p:nvSpPr>
+        <p:spPr>
+          <a:xfrm>
+            <a:off x="1066800" y="1295400"/>
+            <a:ext cx="8077200" cy="4893647"/>
+          </a:xfrm>
+          <a:prstGeom prst="rect">
+            <a:avLst/>
+          </a:prstGeom>
+        </p:spPr>
+        <p:txBody>
+          <a:bodyPr wrap="square">
+            <a:spAutoFit/>
+          </a:bodyPr>
+          <a:lstStyle/>
+          <a:p>
+            <a:r>
+              <a:rPr lang="en-US" sz="1200" dirty="0">
+                <a:latin typeface="Helvetica" panose="020B0604020202020204" pitchFamily="34" charset="0"/>
+                <a:cs typeface="Helvetica" panose="020B0604020202020204" pitchFamily="34" charset="0"/>
+              </a:rPr>
+              <a:t>[</a:t>
+            </a:r>
+            <a:r>
+              <a:rPr lang="en-US" sz="1200" dirty="0" smtClean="0">
+                <a:latin typeface="Helvetica" panose="020B0604020202020204" pitchFamily="34" charset="0"/>
+                <a:cs typeface="Helvetica" panose="020B0604020202020204" pitchFamily="34" charset="0"/>
+              </a:rPr>
+              <a:t>1]</a:t>
+            </a:r>
+            <a:r>
+              <a:rPr lang="tr-TR" sz="1200" dirty="0" smtClean="0">
+                <a:latin typeface="Helvetica" panose="020B0604020202020204" pitchFamily="34" charset="0"/>
+                <a:cs typeface="Helvetica" panose="020B0604020202020204" pitchFamily="34" charset="0"/>
+              </a:rPr>
+              <a:t> </a:t>
+            </a:r>
+            <a:r>
+              <a:rPr lang="en-US" sz="1200" dirty="0" smtClean="0">
+                <a:latin typeface="Helvetica" panose="020B0604020202020204" pitchFamily="34" charset="0"/>
+                <a:cs typeface="Helvetica" panose="020B0604020202020204" pitchFamily="34" charset="0"/>
+              </a:rPr>
+              <a:t>G</a:t>
+            </a:r>
+            <a:r>
+              <a:rPr lang="en-US" sz="1200" dirty="0">
+                <a:latin typeface="Helvetica" panose="020B0604020202020204" pitchFamily="34" charset="0"/>
+                <a:cs typeface="Helvetica" panose="020B0604020202020204" pitchFamily="34" charset="0"/>
+              </a:rPr>
+              <a:t>. Lo </a:t>
+            </a:r>
+            <a:r>
+              <a:rPr lang="en-US" sz="1200" dirty="0" err="1">
+                <a:latin typeface="Helvetica" panose="020B0604020202020204" pitchFamily="34" charset="0"/>
+                <a:cs typeface="Helvetica" panose="020B0604020202020204" pitchFamily="34" charset="0"/>
+              </a:rPr>
+              <a:t>Calzo</a:t>
+            </a:r>
+            <a:r>
+              <a:rPr lang="en-US" sz="1200" dirty="0">
+                <a:latin typeface="Helvetica" panose="020B0604020202020204" pitchFamily="34" charset="0"/>
+                <a:cs typeface="Helvetica" panose="020B0604020202020204" pitchFamily="34" charset="0"/>
+              </a:rPr>
+              <a:t>, G. </a:t>
+            </a:r>
+            <a:r>
+              <a:rPr lang="en-US" sz="1200" dirty="0" err="1">
+                <a:latin typeface="Helvetica" panose="020B0604020202020204" pitchFamily="34" charset="0"/>
+                <a:cs typeface="Helvetica" panose="020B0604020202020204" pitchFamily="34" charset="0"/>
+              </a:rPr>
+              <a:t>Vakil</a:t>
+            </a:r>
+            <a:r>
+              <a:rPr lang="en-US" sz="1200" dirty="0">
+                <a:latin typeface="Helvetica" panose="020B0604020202020204" pitchFamily="34" charset="0"/>
+                <a:cs typeface="Helvetica" panose="020B0604020202020204" pitchFamily="34" charset="0"/>
+              </a:rPr>
+              <a:t>, B. </a:t>
+            </a:r>
+            <a:r>
+              <a:rPr lang="en-US" sz="1200" dirty="0" err="1">
+                <a:latin typeface="Helvetica" panose="020B0604020202020204" pitchFamily="34" charset="0"/>
+                <a:cs typeface="Helvetica" panose="020B0604020202020204" pitchFamily="34" charset="0"/>
+              </a:rPr>
+              <a:t>Mecrow</a:t>
+            </a:r>
+            <a:r>
+              <a:rPr lang="en-US" sz="1200" dirty="0">
+                <a:latin typeface="Helvetica" panose="020B0604020202020204" pitchFamily="34" charset="0"/>
+                <a:cs typeface="Helvetica" panose="020B0604020202020204" pitchFamily="34" charset="0"/>
+              </a:rPr>
+              <a:t>, S. Lambert, T. Cox, C. </a:t>
+            </a:r>
+            <a:r>
+              <a:rPr lang="en-US" sz="1200" dirty="0" err="1">
+                <a:latin typeface="Helvetica" panose="020B0604020202020204" pitchFamily="34" charset="0"/>
+                <a:cs typeface="Helvetica" panose="020B0604020202020204" pitchFamily="34" charset="0"/>
+              </a:rPr>
+              <a:t>Gerada</a:t>
+            </a:r>
+            <a:r>
+              <a:rPr lang="en-US" sz="1200" dirty="0">
+                <a:latin typeface="Helvetica" panose="020B0604020202020204" pitchFamily="34" charset="0"/>
+                <a:cs typeface="Helvetica" panose="020B0604020202020204" pitchFamily="34" charset="0"/>
+              </a:rPr>
+              <a:t>, M. Johnson, and R. </a:t>
+            </a:r>
+            <a:r>
+              <a:rPr lang="en-US" sz="1200" dirty="0" err="1">
+                <a:latin typeface="Helvetica" panose="020B0604020202020204" pitchFamily="34" charset="0"/>
+                <a:cs typeface="Helvetica" panose="020B0604020202020204" pitchFamily="34" charset="0"/>
+              </a:rPr>
+              <a:t>Abebe</a:t>
+            </a:r>
+            <a:r>
+              <a:rPr lang="en-US" sz="1200" dirty="0">
+                <a:latin typeface="Helvetica" panose="020B0604020202020204" pitchFamily="34" charset="0"/>
+                <a:cs typeface="Helvetica" panose="020B0604020202020204" pitchFamily="34" charset="0"/>
+              </a:rPr>
+              <a:t>, “Integrated motor drives: state of the art and future trends,” </a:t>
+            </a:r>
+            <a:r>
+              <a:rPr lang="en-US" sz="1200" i="1" dirty="0">
+                <a:latin typeface="Helvetica" panose="020B0604020202020204" pitchFamily="34" charset="0"/>
+                <a:cs typeface="Helvetica" panose="020B0604020202020204" pitchFamily="34" charset="0"/>
+              </a:rPr>
+              <a:t>IET </a:t>
+            </a:r>
+            <a:r>
+              <a:rPr lang="en-US" sz="1200" i="1" dirty="0" err="1">
+                <a:latin typeface="Helvetica" panose="020B0604020202020204" pitchFamily="34" charset="0"/>
+                <a:cs typeface="Helvetica" panose="020B0604020202020204" pitchFamily="34" charset="0"/>
+              </a:rPr>
+              <a:t>Electr</a:t>
+            </a:r>
+            <a:r>
+              <a:rPr lang="en-US" sz="1200" i="1" dirty="0">
+                <a:latin typeface="Helvetica" panose="020B0604020202020204" pitchFamily="34" charset="0"/>
+                <a:cs typeface="Helvetica" panose="020B0604020202020204" pitchFamily="34" charset="0"/>
+              </a:rPr>
+              <a:t>. Power Appl.</a:t>
+            </a:r>
+            <a:r>
+              <a:rPr lang="en-US" sz="1200" dirty="0">
+                <a:latin typeface="Helvetica" panose="020B0604020202020204" pitchFamily="34" charset="0"/>
+                <a:cs typeface="Helvetica" panose="020B0604020202020204" pitchFamily="34" charset="0"/>
+              </a:rPr>
+              <a:t>, vol. 10, no. 8, pp. 757–771, Sep. 2016</a:t>
+            </a:r>
+            <a:r>
+              <a:rPr lang="en-US" sz="1200" dirty="0" smtClean="0">
+                <a:latin typeface="Helvetica" panose="020B0604020202020204" pitchFamily="34" charset="0"/>
+                <a:cs typeface="Helvetica" panose="020B0604020202020204" pitchFamily="34" charset="0"/>
+              </a:rPr>
+              <a:t>.</a:t>
+            </a:r>
+            <a:endParaRPr lang="tr-TR" sz="1200" dirty="0" smtClean="0">
+              <a:latin typeface="Helvetica" panose="020B0604020202020204" pitchFamily="34" charset="0"/>
+              <a:cs typeface="Helvetica" panose="020B0604020202020204" pitchFamily="34" charset="0"/>
+            </a:endParaRPr>
+          </a:p>
+          <a:p>
+            <a:endParaRPr lang="en-US" sz="1200" dirty="0">
+              <a:latin typeface="Helvetica" panose="020B0604020202020204" pitchFamily="34" charset="0"/>
+              <a:cs typeface="Helvetica" panose="020B0604020202020204" pitchFamily="34" charset="0"/>
+            </a:endParaRPr>
+          </a:p>
+          <a:p>
+            <a:r>
+              <a:rPr lang="en-US" sz="1200" dirty="0">
+                <a:latin typeface="Helvetica" panose="020B0604020202020204" pitchFamily="34" charset="0"/>
+                <a:cs typeface="Helvetica" panose="020B0604020202020204" pitchFamily="34" charset="0"/>
+              </a:rPr>
+              <a:t>[</a:t>
+            </a:r>
+            <a:r>
+              <a:rPr lang="en-US" sz="1200" dirty="0" smtClean="0">
+                <a:latin typeface="Helvetica" panose="020B0604020202020204" pitchFamily="34" charset="0"/>
+                <a:cs typeface="Helvetica" panose="020B0604020202020204" pitchFamily="34" charset="0"/>
+              </a:rPr>
+              <a:t>2]</a:t>
+            </a:r>
+            <a:r>
+              <a:rPr lang="tr-TR" sz="1200" dirty="0" smtClean="0">
+                <a:latin typeface="Helvetica" panose="020B0604020202020204" pitchFamily="34" charset="0"/>
+                <a:cs typeface="Helvetica" panose="020B0604020202020204" pitchFamily="34" charset="0"/>
+              </a:rPr>
+              <a:t> </a:t>
+            </a:r>
+            <a:r>
+              <a:rPr lang="en-US" sz="1200" dirty="0" smtClean="0">
+                <a:latin typeface="Helvetica" panose="020B0604020202020204" pitchFamily="34" charset="0"/>
+                <a:cs typeface="Helvetica" panose="020B0604020202020204" pitchFamily="34" charset="0"/>
+              </a:rPr>
+              <a:t>M</a:t>
+            </a:r>
+            <a:r>
+              <a:rPr lang="en-US" sz="1200" dirty="0">
+                <a:latin typeface="Helvetica" panose="020B0604020202020204" pitchFamily="34" charset="0"/>
+                <a:cs typeface="Helvetica" panose="020B0604020202020204" pitchFamily="34" charset="0"/>
+              </a:rPr>
+              <a:t>. D. </a:t>
+            </a:r>
+            <a:r>
+              <a:rPr lang="en-US" sz="1200" dirty="0" err="1">
+                <a:latin typeface="Helvetica" panose="020B0604020202020204" pitchFamily="34" charset="0"/>
+                <a:cs typeface="Helvetica" panose="020B0604020202020204" pitchFamily="34" charset="0"/>
+              </a:rPr>
+              <a:t>Hennen</a:t>
+            </a:r>
+            <a:r>
+              <a:rPr lang="en-US" sz="1200" dirty="0">
+                <a:latin typeface="Helvetica" panose="020B0604020202020204" pitchFamily="34" charset="0"/>
+                <a:cs typeface="Helvetica" panose="020B0604020202020204" pitchFamily="34" charset="0"/>
+              </a:rPr>
+              <a:t>, M. </a:t>
+            </a:r>
+            <a:r>
+              <a:rPr lang="en-US" sz="1200" dirty="0" err="1">
+                <a:latin typeface="Helvetica" panose="020B0604020202020204" pitchFamily="34" charset="0"/>
+                <a:cs typeface="Helvetica" panose="020B0604020202020204" pitchFamily="34" charset="0"/>
+              </a:rPr>
+              <a:t>Niessen</a:t>
+            </a:r>
+            <a:r>
+              <a:rPr lang="en-US" sz="1200" dirty="0">
+                <a:latin typeface="Helvetica" panose="020B0604020202020204" pitchFamily="34" charset="0"/>
+                <a:cs typeface="Helvetica" panose="020B0604020202020204" pitchFamily="34" charset="0"/>
+              </a:rPr>
+              <a:t>, C. </a:t>
+            </a:r>
+            <a:r>
+              <a:rPr lang="en-US" sz="1200" dirty="0" err="1">
+                <a:latin typeface="Helvetica" panose="020B0604020202020204" pitchFamily="34" charset="0"/>
+                <a:cs typeface="Helvetica" panose="020B0604020202020204" pitchFamily="34" charset="0"/>
+              </a:rPr>
+              <a:t>Heyers</a:t>
+            </a:r>
+            <a:r>
+              <a:rPr lang="en-US" sz="1200" dirty="0">
+                <a:latin typeface="Helvetica" panose="020B0604020202020204" pitchFamily="34" charset="0"/>
+                <a:cs typeface="Helvetica" panose="020B0604020202020204" pitchFamily="34" charset="0"/>
+              </a:rPr>
+              <a:t>, H. J. </a:t>
+            </a:r>
+            <a:r>
+              <a:rPr lang="en-US" sz="1200" dirty="0" err="1">
+                <a:latin typeface="Helvetica" panose="020B0604020202020204" pitchFamily="34" charset="0"/>
+                <a:cs typeface="Helvetica" panose="020B0604020202020204" pitchFamily="34" charset="0"/>
+              </a:rPr>
+              <a:t>Brauer</a:t>
+            </a:r>
+            <a:r>
+              <a:rPr lang="en-US" sz="1200" dirty="0">
+                <a:latin typeface="Helvetica" panose="020B0604020202020204" pitchFamily="34" charset="0"/>
+                <a:cs typeface="Helvetica" panose="020B0604020202020204" pitchFamily="34" charset="0"/>
+              </a:rPr>
+              <a:t>, and R. W. De </a:t>
+            </a:r>
+            <a:r>
+              <a:rPr lang="en-US" sz="1200" dirty="0" err="1">
+                <a:latin typeface="Helvetica" panose="020B0604020202020204" pitchFamily="34" charset="0"/>
+                <a:cs typeface="Helvetica" panose="020B0604020202020204" pitchFamily="34" charset="0"/>
+              </a:rPr>
+              <a:t>Doncker</a:t>
+            </a:r>
+            <a:r>
+              <a:rPr lang="en-US" sz="1200" dirty="0">
+                <a:latin typeface="Helvetica" panose="020B0604020202020204" pitchFamily="34" charset="0"/>
+                <a:cs typeface="Helvetica" panose="020B0604020202020204" pitchFamily="34" charset="0"/>
+              </a:rPr>
+              <a:t>, “Development and control of an integrated and distributed inverter for a fault tolerant five-phase switched reluctance traction drive,” </a:t>
+            </a:r>
+            <a:r>
+              <a:rPr lang="en-US" sz="1200" i="1" dirty="0">
+                <a:latin typeface="Helvetica" panose="020B0604020202020204" pitchFamily="34" charset="0"/>
+                <a:cs typeface="Helvetica" panose="020B0604020202020204" pitchFamily="34" charset="0"/>
+              </a:rPr>
+              <a:t>IEEE Trans. Power Electron.</a:t>
+            </a:r>
+            <a:r>
+              <a:rPr lang="en-US" sz="1200" dirty="0">
+                <a:latin typeface="Helvetica" panose="020B0604020202020204" pitchFamily="34" charset="0"/>
+                <a:cs typeface="Helvetica" panose="020B0604020202020204" pitchFamily="34" charset="0"/>
+              </a:rPr>
+              <a:t>, vol. 27, no. 2, pp. 547–554, 2012</a:t>
+            </a:r>
+            <a:r>
+              <a:rPr lang="en-US" sz="1200" dirty="0" smtClean="0">
+                <a:latin typeface="Helvetica" panose="020B0604020202020204" pitchFamily="34" charset="0"/>
+                <a:cs typeface="Helvetica" panose="020B0604020202020204" pitchFamily="34" charset="0"/>
+              </a:rPr>
+              <a:t>.</a:t>
+            </a:r>
+            <a:endParaRPr lang="tr-TR" sz="1200" dirty="0" smtClean="0">
+              <a:latin typeface="Helvetica" panose="020B0604020202020204" pitchFamily="34" charset="0"/>
+              <a:cs typeface="Helvetica" panose="020B0604020202020204" pitchFamily="34" charset="0"/>
+            </a:endParaRPr>
+          </a:p>
+          <a:p>
+            <a:endParaRPr lang="en-US" sz="1200" dirty="0">
+              <a:latin typeface="Helvetica" panose="020B0604020202020204" pitchFamily="34" charset="0"/>
+              <a:cs typeface="Helvetica" panose="020B0604020202020204" pitchFamily="34" charset="0"/>
+            </a:endParaRPr>
+          </a:p>
+          <a:p>
+            <a:r>
+              <a:rPr lang="en-US" sz="1200" dirty="0">
+                <a:latin typeface="Helvetica" panose="020B0604020202020204" pitchFamily="34" charset="0"/>
+                <a:cs typeface="Helvetica" panose="020B0604020202020204" pitchFamily="34" charset="0"/>
+              </a:rPr>
+              <a:t>[</a:t>
+            </a:r>
+            <a:r>
+              <a:rPr lang="en-US" sz="1200" dirty="0" smtClean="0">
+                <a:latin typeface="Helvetica" panose="020B0604020202020204" pitchFamily="34" charset="0"/>
+                <a:cs typeface="Helvetica" panose="020B0604020202020204" pitchFamily="34" charset="0"/>
+              </a:rPr>
+              <a:t>3]</a:t>
+            </a:r>
+            <a:r>
+              <a:rPr lang="tr-TR" sz="1200" dirty="0" smtClean="0">
+                <a:latin typeface="Helvetica" panose="020B0604020202020204" pitchFamily="34" charset="0"/>
+                <a:cs typeface="Helvetica" panose="020B0604020202020204" pitchFamily="34" charset="0"/>
+              </a:rPr>
+              <a:t> </a:t>
+            </a:r>
+            <a:r>
+              <a:rPr lang="en-US" sz="1200" dirty="0" smtClean="0">
+                <a:latin typeface="Helvetica" panose="020B0604020202020204" pitchFamily="34" charset="0"/>
+                <a:cs typeface="Helvetica" panose="020B0604020202020204" pitchFamily="34" charset="0"/>
+              </a:rPr>
+              <a:t>J</a:t>
+            </a:r>
+            <a:r>
+              <a:rPr lang="en-US" sz="1200" dirty="0">
+                <a:latin typeface="Helvetica" panose="020B0604020202020204" pitchFamily="34" charset="0"/>
+                <a:cs typeface="Helvetica" panose="020B0604020202020204" pitchFamily="34" charset="0"/>
+              </a:rPr>
+              <a:t>. Wang, Y. Li, and Y. Han, “Integrated Modular Motor Drive Design With GaN Power FETs,” </a:t>
+            </a:r>
+            <a:r>
+              <a:rPr lang="en-US" sz="1200" i="1" dirty="0">
+                <a:latin typeface="Helvetica" panose="020B0604020202020204" pitchFamily="34" charset="0"/>
+                <a:cs typeface="Helvetica" panose="020B0604020202020204" pitchFamily="34" charset="0"/>
+              </a:rPr>
+              <a:t>IEEE Trans. Ind. Appl.</a:t>
+            </a:r>
+            <a:r>
+              <a:rPr lang="en-US" sz="1200" dirty="0">
+                <a:latin typeface="Helvetica" panose="020B0604020202020204" pitchFamily="34" charset="0"/>
+                <a:cs typeface="Helvetica" panose="020B0604020202020204" pitchFamily="34" charset="0"/>
+              </a:rPr>
+              <a:t>, vol. 51, no. c, pp. 3198–3207, 2015</a:t>
+            </a:r>
+            <a:r>
+              <a:rPr lang="en-US" sz="1200" dirty="0" smtClean="0">
+                <a:latin typeface="Helvetica" panose="020B0604020202020204" pitchFamily="34" charset="0"/>
+                <a:cs typeface="Helvetica" panose="020B0604020202020204" pitchFamily="34" charset="0"/>
+              </a:rPr>
+              <a:t>.</a:t>
+            </a:r>
+            <a:endParaRPr lang="tr-TR" sz="1200" dirty="0" smtClean="0">
+              <a:latin typeface="Helvetica" panose="020B0604020202020204" pitchFamily="34" charset="0"/>
+              <a:cs typeface="Helvetica" panose="020B0604020202020204" pitchFamily="34" charset="0"/>
+            </a:endParaRPr>
+          </a:p>
+          <a:p>
+            <a:endParaRPr lang="en-US" sz="1200" dirty="0">
+              <a:latin typeface="Helvetica" panose="020B0604020202020204" pitchFamily="34" charset="0"/>
+              <a:cs typeface="Helvetica" panose="020B0604020202020204" pitchFamily="34" charset="0"/>
+            </a:endParaRPr>
+          </a:p>
+          <a:p>
+            <a:r>
+              <a:rPr lang="en-US" sz="1200" dirty="0">
+                <a:latin typeface="Helvetica" panose="020B0604020202020204" pitchFamily="34" charset="0"/>
+                <a:cs typeface="Helvetica" panose="020B0604020202020204" pitchFamily="34" charset="0"/>
+              </a:rPr>
+              <a:t>[</a:t>
+            </a:r>
+            <a:r>
+              <a:rPr lang="en-US" sz="1200" dirty="0" smtClean="0">
+                <a:latin typeface="Helvetica" panose="020B0604020202020204" pitchFamily="34" charset="0"/>
+                <a:cs typeface="Helvetica" panose="020B0604020202020204" pitchFamily="34" charset="0"/>
+              </a:rPr>
+              <a:t>4]</a:t>
+            </a:r>
+            <a:r>
+              <a:rPr lang="tr-TR" sz="1200" dirty="0" smtClean="0">
+                <a:latin typeface="Helvetica" panose="020B0604020202020204" pitchFamily="34" charset="0"/>
+                <a:cs typeface="Helvetica" panose="020B0604020202020204" pitchFamily="34" charset="0"/>
+              </a:rPr>
+              <a:t> </a:t>
+            </a:r>
+            <a:r>
+              <a:rPr lang="en-US" sz="1200" dirty="0" smtClean="0">
+                <a:latin typeface="Helvetica" panose="020B0604020202020204" pitchFamily="34" charset="0"/>
+                <a:cs typeface="Helvetica" panose="020B0604020202020204" pitchFamily="34" charset="0"/>
+              </a:rPr>
+              <a:t>M</a:t>
+            </a:r>
+            <a:r>
+              <a:rPr lang="en-US" sz="1200" dirty="0">
+                <a:latin typeface="Helvetica" panose="020B0604020202020204" pitchFamily="34" charset="0"/>
+                <a:cs typeface="Helvetica" panose="020B0604020202020204" pitchFamily="34" charset="0"/>
+              </a:rPr>
+              <a:t>. </a:t>
+            </a:r>
+            <a:r>
+              <a:rPr lang="en-US" sz="1200" dirty="0" err="1">
+                <a:latin typeface="Helvetica" panose="020B0604020202020204" pitchFamily="34" charset="0"/>
+                <a:cs typeface="Helvetica" panose="020B0604020202020204" pitchFamily="34" charset="0"/>
+              </a:rPr>
+              <a:t>Ugur</a:t>
+            </a:r>
+            <a:r>
+              <a:rPr lang="en-US" sz="1200" dirty="0">
+                <a:latin typeface="Helvetica" panose="020B0604020202020204" pitchFamily="34" charset="0"/>
+                <a:cs typeface="Helvetica" panose="020B0604020202020204" pitchFamily="34" charset="0"/>
+              </a:rPr>
+              <a:t> and O. Keysan, “DC link capacitor optimization for integrated modular motor drives,” </a:t>
+            </a:r>
+            <a:r>
+              <a:rPr lang="en-US" sz="1200" i="1" dirty="0">
+                <a:latin typeface="Helvetica" panose="020B0604020202020204" pitchFamily="34" charset="0"/>
+                <a:cs typeface="Helvetica" panose="020B0604020202020204" pitchFamily="34" charset="0"/>
+              </a:rPr>
+              <a:t>2017 IEEE 26th Int. </a:t>
+            </a:r>
+            <a:r>
+              <a:rPr lang="en-US" sz="1200" i="1" dirty="0" err="1">
+                <a:latin typeface="Helvetica" panose="020B0604020202020204" pitchFamily="34" charset="0"/>
+                <a:cs typeface="Helvetica" panose="020B0604020202020204" pitchFamily="34" charset="0"/>
+              </a:rPr>
+              <a:t>Symp</a:t>
+            </a:r>
+            <a:r>
+              <a:rPr lang="en-US" sz="1200" i="1" dirty="0">
+                <a:latin typeface="Helvetica" panose="020B0604020202020204" pitchFamily="34" charset="0"/>
+                <a:cs typeface="Helvetica" panose="020B0604020202020204" pitchFamily="34" charset="0"/>
+              </a:rPr>
+              <a:t>. Ind. Electron.</a:t>
+            </a:r>
+            <a:r>
+              <a:rPr lang="en-US" sz="1200" dirty="0">
+                <a:latin typeface="Helvetica" panose="020B0604020202020204" pitchFamily="34" charset="0"/>
+                <a:cs typeface="Helvetica" panose="020B0604020202020204" pitchFamily="34" charset="0"/>
+              </a:rPr>
+              <a:t>, vol. </a:t>
+            </a:r>
+            <a:r>
+              <a:rPr lang="en-US" sz="1200" dirty="0" err="1">
+                <a:latin typeface="Helvetica" panose="020B0604020202020204" pitchFamily="34" charset="0"/>
+                <a:cs typeface="Helvetica" panose="020B0604020202020204" pitchFamily="34" charset="0"/>
+              </a:rPr>
+              <a:t>i</a:t>
+            </a:r>
+            <a:r>
+              <a:rPr lang="en-US" sz="1200" dirty="0">
+                <a:latin typeface="Helvetica" panose="020B0604020202020204" pitchFamily="34" charset="0"/>
+                <a:cs typeface="Helvetica" panose="020B0604020202020204" pitchFamily="34" charset="0"/>
+              </a:rPr>
+              <a:t>, pp. 263–270, 2017</a:t>
+            </a:r>
+            <a:r>
+              <a:rPr lang="en-US" sz="1200" dirty="0" smtClean="0">
+                <a:latin typeface="Helvetica" panose="020B0604020202020204" pitchFamily="34" charset="0"/>
+                <a:cs typeface="Helvetica" panose="020B0604020202020204" pitchFamily="34" charset="0"/>
+              </a:rPr>
+              <a:t>.</a:t>
+            </a:r>
+            <a:endParaRPr lang="tr-TR" sz="1200" dirty="0" smtClean="0">
+              <a:latin typeface="Helvetica" panose="020B0604020202020204" pitchFamily="34" charset="0"/>
+              <a:cs typeface="Helvetica" panose="020B0604020202020204" pitchFamily="34" charset="0"/>
+            </a:endParaRPr>
+          </a:p>
+          <a:p>
+            <a:endParaRPr lang="en-US" sz="1200" dirty="0">
+              <a:latin typeface="Helvetica" panose="020B0604020202020204" pitchFamily="34" charset="0"/>
+              <a:cs typeface="Helvetica" panose="020B0604020202020204" pitchFamily="34" charset="0"/>
+            </a:endParaRPr>
+          </a:p>
+          <a:p>
+            <a:r>
+              <a:rPr lang="en-US" sz="1200" dirty="0">
+                <a:latin typeface="Helvetica" panose="020B0604020202020204" pitchFamily="34" charset="0"/>
+                <a:cs typeface="Helvetica" panose="020B0604020202020204" pitchFamily="34" charset="0"/>
+              </a:rPr>
+              <a:t>[</a:t>
+            </a:r>
+            <a:r>
+              <a:rPr lang="en-US" sz="1200" dirty="0" smtClean="0">
+                <a:latin typeface="Helvetica" panose="020B0604020202020204" pitchFamily="34" charset="0"/>
+                <a:cs typeface="Helvetica" panose="020B0604020202020204" pitchFamily="34" charset="0"/>
+              </a:rPr>
+              <a:t>5]</a:t>
+            </a:r>
+            <a:r>
+              <a:rPr lang="tr-TR" sz="1200" dirty="0" smtClean="0">
+                <a:latin typeface="Helvetica" panose="020B0604020202020204" pitchFamily="34" charset="0"/>
+                <a:cs typeface="Helvetica" panose="020B0604020202020204" pitchFamily="34" charset="0"/>
+              </a:rPr>
+              <a:t> </a:t>
+            </a:r>
+            <a:r>
+              <a:rPr lang="en-US" sz="1200" dirty="0" smtClean="0">
+                <a:latin typeface="Helvetica" panose="020B0604020202020204" pitchFamily="34" charset="0"/>
+                <a:cs typeface="Helvetica" panose="020B0604020202020204" pitchFamily="34" charset="0"/>
+              </a:rPr>
+              <a:t>A</a:t>
+            </a:r>
+            <a:r>
+              <a:rPr lang="en-US" sz="1200" dirty="0">
+                <a:latin typeface="Helvetica" panose="020B0604020202020204" pitchFamily="34" charset="0"/>
+                <a:cs typeface="Helvetica" panose="020B0604020202020204" pitchFamily="34" charset="0"/>
+              </a:rPr>
+              <a:t>. </a:t>
+            </a:r>
+            <a:r>
+              <a:rPr lang="en-US" sz="1200" dirty="0" err="1">
+                <a:latin typeface="Helvetica" panose="020B0604020202020204" pitchFamily="34" charset="0"/>
+                <a:cs typeface="Helvetica" panose="020B0604020202020204" pitchFamily="34" charset="0"/>
+              </a:rPr>
+              <a:t>Shea</a:t>
+            </a:r>
+            <a:r>
+              <a:rPr lang="en-US" sz="1200" dirty="0">
+                <a:latin typeface="Helvetica" panose="020B0604020202020204" pitchFamily="34" charset="0"/>
+                <a:cs typeface="Helvetica" panose="020B0604020202020204" pitchFamily="34" charset="0"/>
+              </a:rPr>
+              <a:t> and T. M. </a:t>
+            </a:r>
+            <a:r>
+              <a:rPr lang="en-US" sz="1200" dirty="0" err="1">
+                <a:latin typeface="Helvetica" panose="020B0604020202020204" pitchFamily="34" charset="0"/>
+                <a:cs typeface="Helvetica" panose="020B0604020202020204" pitchFamily="34" charset="0"/>
+              </a:rPr>
+              <a:t>Jahns</a:t>
+            </a:r>
+            <a:r>
+              <a:rPr lang="en-US" sz="1200" dirty="0">
+                <a:latin typeface="Helvetica" panose="020B0604020202020204" pitchFamily="34" charset="0"/>
+                <a:cs typeface="Helvetica" panose="020B0604020202020204" pitchFamily="34" charset="0"/>
+              </a:rPr>
+              <a:t>, “Hardware integration for an integrated modular motor drive including distributed control,” in </a:t>
+            </a:r>
+            <a:r>
+              <a:rPr lang="en-US" sz="1200" i="1" dirty="0">
+                <a:latin typeface="Helvetica" panose="020B0604020202020204" pitchFamily="34" charset="0"/>
+                <a:cs typeface="Helvetica" panose="020B0604020202020204" pitchFamily="34" charset="0"/>
+              </a:rPr>
+              <a:t>2014 IEEE Energy Conversion Congress and Exposition (ECCE)</a:t>
+            </a:r>
+            <a:r>
+              <a:rPr lang="en-US" sz="1200" dirty="0">
+                <a:latin typeface="Helvetica" panose="020B0604020202020204" pitchFamily="34" charset="0"/>
+                <a:cs typeface="Helvetica" panose="020B0604020202020204" pitchFamily="34" charset="0"/>
+              </a:rPr>
+              <a:t>, 2014, pp. 4881–4887</a:t>
+            </a:r>
+            <a:r>
+              <a:rPr lang="en-US" sz="1200" dirty="0" smtClean="0">
+                <a:latin typeface="Helvetica" panose="020B0604020202020204" pitchFamily="34" charset="0"/>
+                <a:cs typeface="Helvetica" panose="020B0604020202020204" pitchFamily="34" charset="0"/>
+              </a:rPr>
+              <a:t>.</a:t>
+            </a:r>
+            <a:endParaRPr lang="tr-TR" sz="1200" dirty="0" smtClean="0">
+              <a:latin typeface="Helvetica" panose="020B0604020202020204" pitchFamily="34" charset="0"/>
+              <a:cs typeface="Helvetica" panose="020B0604020202020204" pitchFamily="34" charset="0"/>
+            </a:endParaRPr>
+          </a:p>
+          <a:p>
+            <a:endParaRPr lang="en-US" sz="1200" dirty="0">
+              <a:latin typeface="Helvetica" panose="020B0604020202020204" pitchFamily="34" charset="0"/>
+              <a:cs typeface="Helvetica" panose="020B0604020202020204" pitchFamily="34" charset="0"/>
+            </a:endParaRPr>
+          </a:p>
+          <a:p>
+            <a:r>
+              <a:rPr lang="en-US" sz="1200" dirty="0">
+                <a:latin typeface="Helvetica" panose="020B0604020202020204" pitchFamily="34" charset="0"/>
+                <a:cs typeface="Helvetica" panose="020B0604020202020204" pitchFamily="34" charset="0"/>
+              </a:rPr>
+              <a:t>[</a:t>
+            </a:r>
+            <a:r>
+              <a:rPr lang="en-US" sz="1200" dirty="0" smtClean="0">
+                <a:latin typeface="Helvetica" panose="020B0604020202020204" pitchFamily="34" charset="0"/>
+                <a:cs typeface="Helvetica" panose="020B0604020202020204" pitchFamily="34" charset="0"/>
+              </a:rPr>
+              <a:t>6]</a:t>
+            </a:r>
+            <a:r>
+              <a:rPr lang="tr-TR" sz="1200" dirty="0" smtClean="0">
+                <a:latin typeface="Helvetica" panose="020B0604020202020204" pitchFamily="34" charset="0"/>
+                <a:cs typeface="Helvetica" panose="020B0604020202020204" pitchFamily="34" charset="0"/>
+              </a:rPr>
+              <a:t> </a:t>
+            </a:r>
+            <a:r>
+              <a:rPr lang="en-US" sz="1200" dirty="0" smtClean="0">
+                <a:latin typeface="Helvetica" panose="020B0604020202020204" pitchFamily="34" charset="0"/>
+                <a:cs typeface="Helvetica" panose="020B0604020202020204" pitchFamily="34" charset="0"/>
+              </a:rPr>
+              <a:t>N</a:t>
+            </a:r>
+            <a:r>
+              <a:rPr lang="en-US" sz="1200" dirty="0">
+                <a:latin typeface="Helvetica" panose="020B0604020202020204" pitchFamily="34" charset="0"/>
+                <a:cs typeface="Helvetica" panose="020B0604020202020204" pitchFamily="34" charset="0"/>
+              </a:rPr>
+              <a:t>. </a:t>
+            </a:r>
+            <a:r>
+              <a:rPr lang="en-US" sz="1200" dirty="0" err="1">
+                <a:latin typeface="Helvetica" panose="020B0604020202020204" pitchFamily="34" charset="0"/>
+                <a:cs typeface="Helvetica" panose="020B0604020202020204" pitchFamily="34" charset="0"/>
+              </a:rPr>
+              <a:t>Bekka</a:t>
+            </a:r>
+            <a:r>
+              <a:rPr lang="en-US" sz="1200" dirty="0">
+                <a:latin typeface="Helvetica" panose="020B0604020202020204" pitchFamily="34" charset="0"/>
+                <a:cs typeface="Helvetica" panose="020B0604020202020204" pitchFamily="34" charset="0"/>
+              </a:rPr>
+              <a:t>, M. E. H. </a:t>
+            </a:r>
+            <a:r>
+              <a:rPr lang="en-US" sz="1200" dirty="0" err="1">
+                <a:latin typeface="Helvetica" panose="020B0604020202020204" pitchFamily="34" charset="0"/>
+                <a:cs typeface="Helvetica" panose="020B0604020202020204" pitchFamily="34" charset="0"/>
+              </a:rPr>
+              <a:t>Zaim</a:t>
+            </a:r>
+            <a:r>
+              <a:rPr lang="en-US" sz="1200" dirty="0">
+                <a:latin typeface="Helvetica" panose="020B0604020202020204" pitchFamily="34" charset="0"/>
+                <a:cs typeface="Helvetica" panose="020B0604020202020204" pitchFamily="34" charset="0"/>
+              </a:rPr>
+              <a:t>, N. Bernard, and D. Trichet, “A Novel Methodology for Optimal Design of Fractional Slot with Concentrated Windings,” </a:t>
+            </a:r>
+            <a:r>
+              <a:rPr lang="en-US" sz="1200" i="1" dirty="0">
+                <a:latin typeface="Helvetica" panose="020B0604020202020204" pitchFamily="34" charset="0"/>
+                <a:cs typeface="Helvetica" panose="020B0604020202020204" pitchFamily="34" charset="0"/>
+              </a:rPr>
+              <a:t>IEEE Trans. Energy Convers.</a:t>
+            </a:r>
+            <a:r>
+              <a:rPr lang="en-US" sz="1200" dirty="0">
+                <a:latin typeface="Helvetica" panose="020B0604020202020204" pitchFamily="34" charset="0"/>
+                <a:cs typeface="Helvetica" panose="020B0604020202020204" pitchFamily="34" charset="0"/>
+              </a:rPr>
+              <a:t>, vol. 31, no. 3, pp. 1153–1160, 2016</a:t>
+            </a:r>
+            <a:r>
+              <a:rPr lang="en-US" sz="1200" dirty="0" smtClean="0">
+                <a:latin typeface="Helvetica" panose="020B0604020202020204" pitchFamily="34" charset="0"/>
+                <a:cs typeface="Helvetica" panose="020B0604020202020204" pitchFamily="34" charset="0"/>
+              </a:rPr>
+              <a:t>.</a:t>
+            </a:r>
+            <a:endParaRPr lang="tr-TR" sz="1200" dirty="0" smtClean="0">
+              <a:latin typeface="Helvetica" panose="020B0604020202020204" pitchFamily="34" charset="0"/>
+              <a:cs typeface="Helvetica" panose="020B0604020202020204" pitchFamily="34" charset="0"/>
+            </a:endParaRPr>
+          </a:p>
+          <a:p>
+            <a:endParaRPr lang="en-US" sz="1200" dirty="0">
+              <a:latin typeface="Helvetica" panose="020B0604020202020204" pitchFamily="34" charset="0"/>
+              <a:cs typeface="Helvetica" panose="020B0604020202020204" pitchFamily="34" charset="0"/>
+            </a:endParaRPr>
+          </a:p>
+          <a:p>
+            <a:r>
+              <a:rPr lang="en-US" sz="1200" dirty="0">
+                <a:latin typeface="Helvetica" panose="020B0604020202020204" pitchFamily="34" charset="0"/>
+                <a:cs typeface="Helvetica" panose="020B0604020202020204" pitchFamily="34" charset="0"/>
+              </a:rPr>
+              <a:t>[</a:t>
+            </a:r>
+            <a:r>
+              <a:rPr lang="en-US" sz="1200" dirty="0" smtClean="0">
+                <a:latin typeface="Helvetica" panose="020B0604020202020204" pitchFamily="34" charset="0"/>
+                <a:cs typeface="Helvetica" panose="020B0604020202020204" pitchFamily="34" charset="0"/>
+              </a:rPr>
+              <a:t>7]</a:t>
+            </a:r>
+            <a:r>
+              <a:rPr lang="tr-TR" sz="1200" dirty="0" smtClean="0">
+                <a:latin typeface="Helvetica" panose="020B0604020202020204" pitchFamily="34" charset="0"/>
+                <a:cs typeface="Helvetica" panose="020B0604020202020204" pitchFamily="34" charset="0"/>
+              </a:rPr>
+              <a:t> </a:t>
+            </a:r>
+            <a:r>
+              <a:rPr lang="en-US" sz="1200" dirty="0" smtClean="0">
+                <a:latin typeface="Helvetica" panose="020B0604020202020204" pitchFamily="34" charset="0"/>
+                <a:cs typeface="Helvetica" panose="020B0604020202020204" pitchFamily="34" charset="0"/>
+              </a:rPr>
+              <a:t>GaN </a:t>
+            </a:r>
+            <a:r>
+              <a:rPr lang="en-US" sz="1200" dirty="0">
+                <a:latin typeface="Helvetica" panose="020B0604020202020204" pitchFamily="34" charset="0"/>
+                <a:cs typeface="Helvetica" panose="020B0604020202020204" pitchFamily="34" charset="0"/>
+              </a:rPr>
+              <a:t>Systems, “GaN Systems.” [Online]. Available: http://www.gansystems.com/. [Accessed: 15-Jan-2018</a:t>
+            </a:r>
+            <a:r>
+              <a:rPr lang="en-US" sz="1200" dirty="0" smtClean="0">
+                <a:latin typeface="Helvetica" panose="020B0604020202020204" pitchFamily="34" charset="0"/>
+                <a:cs typeface="Helvetica" panose="020B0604020202020204" pitchFamily="34" charset="0"/>
+              </a:rPr>
+              <a:t>].</a:t>
+            </a:r>
+            <a:endParaRPr lang="tr-TR" sz="1200" dirty="0" smtClean="0">
+              <a:latin typeface="Helvetica" panose="020B0604020202020204" pitchFamily="34" charset="0"/>
+              <a:cs typeface="Helvetica" panose="020B0604020202020204" pitchFamily="34" charset="0"/>
+            </a:endParaRPr>
+          </a:p>
+          <a:p>
+            <a:endParaRPr lang="en-US" sz="1200" dirty="0">
+              <a:latin typeface="Helvetica" panose="020B0604020202020204" pitchFamily="34" charset="0"/>
+              <a:cs typeface="Helvetica" panose="020B0604020202020204" pitchFamily="34" charset="0"/>
+            </a:endParaRPr>
+          </a:p>
+          <a:p>
+            <a:r>
+              <a:rPr lang="en-US" sz="1200" dirty="0">
+                <a:latin typeface="Helvetica" panose="020B0604020202020204" pitchFamily="34" charset="0"/>
+                <a:cs typeface="Helvetica" panose="020B0604020202020204" pitchFamily="34" charset="0"/>
+              </a:rPr>
+              <a:t>[</a:t>
+            </a:r>
+            <a:r>
+              <a:rPr lang="en-US" sz="1200" dirty="0" smtClean="0">
+                <a:latin typeface="Helvetica" panose="020B0604020202020204" pitchFamily="34" charset="0"/>
+                <a:cs typeface="Helvetica" panose="020B0604020202020204" pitchFamily="34" charset="0"/>
+              </a:rPr>
+              <a:t>8]</a:t>
+            </a:r>
+            <a:r>
+              <a:rPr lang="tr-TR" sz="1200" dirty="0" smtClean="0">
+                <a:latin typeface="Helvetica" panose="020B0604020202020204" pitchFamily="34" charset="0"/>
+                <a:cs typeface="Helvetica" panose="020B0604020202020204" pitchFamily="34" charset="0"/>
+              </a:rPr>
+              <a:t> </a:t>
+            </a:r>
+            <a:r>
+              <a:rPr lang="en-US" sz="1200" dirty="0" smtClean="0">
+                <a:latin typeface="Helvetica" panose="020B0604020202020204" pitchFamily="34" charset="0"/>
+                <a:cs typeface="Helvetica" panose="020B0604020202020204" pitchFamily="34" charset="0"/>
+              </a:rPr>
+              <a:t>TDK</a:t>
+            </a:r>
+            <a:r>
+              <a:rPr lang="en-US" sz="1200" dirty="0">
+                <a:latin typeface="Helvetica" panose="020B0604020202020204" pitchFamily="34" charset="0"/>
+                <a:cs typeface="Helvetica" panose="020B0604020202020204" pitchFamily="34" charset="0"/>
+              </a:rPr>
+              <a:t>, “Film Capacitors, Metallized Polypropylene Film Capacitors (MKP) - B32674...B32674 Datasheet,” no. May. 2015</a:t>
+            </a:r>
+            <a:r>
+              <a:rPr lang="en-US" sz="1200" dirty="0" smtClean="0">
+                <a:latin typeface="Helvetica" panose="020B0604020202020204" pitchFamily="34" charset="0"/>
+                <a:cs typeface="Helvetica" panose="020B0604020202020204" pitchFamily="34" charset="0"/>
+              </a:rPr>
+              <a:t>.</a:t>
+            </a:r>
+            <a:endParaRPr lang="tr-TR" sz="1200" dirty="0" smtClean="0">
+              <a:latin typeface="Helvetica" panose="020B0604020202020204" pitchFamily="34" charset="0"/>
+              <a:cs typeface="Helvetica" panose="020B0604020202020204" pitchFamily="34" charset="0"/>
+            </a:endParaRPr>
+          </a:p>
+          <a:p>
+            <a:endParaRPr lang="en-US" sz="1200" dirty="0">
+              <a:latin typeface="Helvetica" panose="020B0604020202020204" pitchFamily="34" charset="0"/>
+              <a:cs typeface="Helvetica" panose="020B0604020202020204" pitchFamily="34" charset="0"/>
+            </a:endParaRPr>
+          </a:p>
+          <a:p>
+            <a:r>
+              <a:rPr lang="en-US" sz="1200" dirty="0">
+                <a:latin typeface="Helvetica" panose="020B0604020202020204" pitchFamily="34" charset="0"/>
+                <a:cs typeface="Helvetica" panose="020B0604020202020204" pitchFamily="34" charset="0"/>
+              </a:rPr>
+              <a:t>[</a:t>
+            </a:r>
+            <a:r>
+              <a:rPr lang="en-US" sz="1200" dirty="0" smtClean="0">
+                <a:latin typeface="Helvetica" panose="020B0604020202020204" pitchFamily="34" charset="0"/>
+                <a:cs typeface="Helvetica" panose="020B0604020202020204" pitchFamily="34" charset="0"/>
+              </a:rPr>
+              <a:t>9]</a:t>
+            </a:r>
+            <a:r>
+              <a:rPr lang="tr-TR" sz="1200" dirty="0" smtClean="0">
+                <a:latin typeface="Helvetica" panose="020B0604020202020204" pitchFamily="34" charset="0"/>
+                <a:cs typeface="Helvetica" panose="020B0604020202020204" pitchFamily="34" charset="0"/>
+              </a:rPr>
+              <a:t> </a:t>
+            </a:r>
+            <a:r>
+              <a:rPr lang="en-US" sz="1200" dirty="0" smtClean="0">
+                <a:latin typeface="Helvetica" panose="020B0604020202020204" pitchFamily="34" charset="0"/>
+                <a:cs typeface="Helvetica" panose="020B0604020202020204" pitchFamily="34" charset="0"/>
+              </a:rPr>
+              <a:t>R</a:t>
+            </a:r>
+            <a:r>
+              <a:rPr lang="en-US" sz="1200" dirty="0">
+                <a:latin typeface="Helvetica" panose="020B0604020202020204" pitchFamily="34" charset="0"/>
+                <a:cs typeface="Helvetica" panose="020B0604020202020204" pitchFamily="34" charset="0"/>
+              </a:rPr>
+              <a:t>. E. Simons, “Estimating Parallel Plate-Fin Heat Sink Thermal Resistance.” [Online]. Available: https://www.electronics-cooling.com/2003/02/estimating-parallel-plate-fin-heat-sink-thermal-resistance</a:t>
+            </a:r>
+            <a:r>
+              <a:rPr lang="en-US" sz="1200" dirty="0" smtClean="0">
+                <a:latin typeface="Helvetica" panose="020B0604020202020204" pitchFamily="34" charset="0"/>
+                <a:cs typeface="Helvetica" panose="020B0604020202020204" pitchFamily="34" charset="0"/>
+              </a:rPr>
+              <a:t>/.</a:t>
+            </a:r>
+            <a:endParaRPr lang="en-US" sz="1200" dirty="0">
+              <a:latin typeface="Helvetica" panose="020B0604020202020204" pitchFamily="34" charset="0"/>
+              <a:cs typeface="Helvetica" panose="020B0604020202020204" pitchFamily="34" charset="0"/>
+            </a:endParaRPr>
+          </a:p>
+        </p:txBody>
+      </p:sp>
+    </p:spTree>
+    <p:extLst>
+      <p:ext uri="{BB962C8B-B14F-4D97-AF65-F5344CB8AC3E}">
+        <p14:creationId xmlns:p14="http://schemas.microsoft.com/office/powerpoint/2010/main" val="198061606"/>
+      </p:ext>
+    </p:extLst>
+  </p:cSld>
+  <p:clrMapOvr>
+    <a:masterClrMapping/>
+  </p:clrMapOvr>
+  <p:timing>
+    <p:tnLst>
+      <p:par>
+        <p:cTn id="1" dur="indefinite" restart="never" nodeType="tmRoot"/>
+      </p:par>
+    </p:tnLst>
+  </p:timing>
+</p:sld>
+</file>
+
+<file path=ppt/slides/slide16.xml><?xml version="1.0" encoding="utf-8"?>
+<p:sld xmlns:a="http://schemas.openxmlformats.org/drawingml/2006/main" xmlns:r="http://schemas.openxmlformats.org/officeDocument/2006/relationships" xmlns:p="http://schemas.openxmlformats.org/presentationml/2006/main">
+  <p:cSld>
+    <p:spTree>
+      <p:nvGrpSpPr>
+        <p:cNvPr id="1" name=""/>
+        <p:cNvGrpSpPr/>
+        <p:nvPr/>
+      </p:nvGrpSpPr>
+      <p:grpSpPr>
+        <a:xfrm>
+          <a:off x="0" y="0"/>
+          <a:ext cx="0" cy="0"/>
+          <a:chOff x="0" y="0"/>
+          <a:chExt cx="0" cy="0"/>
+        </a:xfrm>
+      </p:grpSpPr>
+      <p:sp>
+        <p:nvSpPr>
+          <p:cNvPr id="10" name="Rectangle 9"/>
+          <p:cNvSpPr/>
+          <p:nvPr/>
+        </p:nvSpPr>
+        <p:spPr>
+          <a:xfrm>
+            <a:off x="0" y="12106"/>
+            <a:ext cx="1011942" cy="6854083"/>
+          </a:xfrm>
+          <a:prstGeom prst="rect">
+            <a:avLst/>
+          </a:prstGeom>
+          <a:gradFill flip="none" rotWithShape="1">
+            <a:gsLst>
+              <a:gs pos="50000">
+                <a:srgbClr val="D00000"/>
+              </a:gs>
+              <a:gs pos="0">
+                <a:srgbClr val="FF0000">
+                  <a:shade val="30000"/>
+                  <a:satMod val="115000"/>
+                </a:srgbClr>
+              </a:gs>
+              <a:gs pos="100000">
+                <a:schemeClr val="accent2">
+                  <a:lumMod val="60000"/>
+                  <a:lumOff val="40000"/>
+                </a:schemeClr>
+              </a:gs>
+            </a:gsLst>
+            <a:lin ang="5400000" scaled="1"/>
+            <a:tileRect/>
+          </a:gradFill>
+          <a:ln>
+            <a:noFill/>
+          </a:ln>
+        </p:spPr>
+        <p:style>
+          <a:lnRef idx="2">
+            <a:schemeClr val="accent1">
+              <a:shade val="50000"/>
+            </a:schemeClr>
+          </a:lnRef>
+          <a:fillRef idx="1">
+            <a:schemeClr val="accent1"/>
+          </a:fillRef>
+          <a:effectRef idx="0">
+            <a:schemeClr val="accent1"/>
+          </a:effectRef>
+          <a:fontRef idx="minor">
+            <a:schemeClr val="lt1"/>
+          </a:fontRef>
+        </p:style>
+        <p:txBody>
+          <a:bodyPr rtlCol="0" anchor="ctr"/>
+          <a:lstStyle/>
+          <a:p>
+            <a:pPr algn="ctr"/>
+            <a:endParaRPr lang="tr-TR"/>
+          </a:p>
+        </p:txBody>
+      </p:sp>
+      <p:cxnSp>
+        <p:nvCxnSpPr>
+          <p:cNvPr id="11" name="Straight Connector 10"/>
+          <p:cNvCxnSpPr/>
+          <p:nvPr/>
+        </p:nvCxnSpPr>
+        <p:spPr>
+          <a:xfrm>
+            <a:off x="1189918" y="838200"/>
+            <a:ext cx="7649282" cy="0"/>
+          </a:xfrm>
+          <a:prstGeom prst="line">
+            <a:avLst/>
+          </a:prstGeom>
+          <a:ln w="50800">
+            <a:solidFill>
+              <a:srgbClr val="F20000"/>
+            </a:solidFill>
+          </a:ln>
+        </p:spPr>
+        <p:style>
+          <a:lnRef idx="1">
+            <a:schemeClr val="accent1"/>
+          </a:lnRef>
+          <a:fillRef idx="0">
+            <a:schemeClr val="accent1"/>
+          </a:fillRef>
+          <a:effectRef idx="0">
+            <a:schemeClr val="accent1"/>
+          </a:effectRef>
+          <a:fontRef idx="minor">
+            <a:schemeClr val="tx1"/>
+          </a:fontRef>
+        </p:style>
+      </p:cxnSp>
+      <p:cxnSp>
+        <p:nvCxnSpPr>
+          <p:cNvPr id="15" name="Straight Connector 14"/>
+          <p:cNvCxnSpPr/>
+          <p:nvPr/>
+        </p:nvCxnSpPr>
+        <p:spPr>
+          <a:xfrm>
+            <a:off x="1189918" y="914400"/>
+            <a:ext cx="7649282" cy="0"/>
+          </a:xfrm>
+          <a:prstGeom prst="line">
+            <a:avLst/>
+          </a:prstGeom>
+          <a:ln w="19050">
+            <a:solidFill>
+              <a:srgbClr val="F20000"/>
+            </a:solidFill>
+          </a:ln>
+        </p:spPr>
+        <p:style>
+          <a:lnRef idx="1">
+            <a:schemeClr val="accent1"/>
+          </a:lnRef>
+          <a:fillRef idx="0">
+            <a:schemeClr val="accent1"/>
+          </a:fillRef>
+          <a:effectRef idx="0">
+            <a:schemeClr val="accent1"/>
+          </a:effectRef>
+          <a:fontRef idx="minor">
+            <a:schemeClr val="tx1"/>
+          </a:fontRef>
+        </p:style>
+      </p:cxnSp>
+      <p:sp>
+        <p:nvSpPr>
+          <p:cNvPr id="2" name="Slide Number Placeholder 1"/>
+          <p:cNvSpPr>
+            <a:spLocks noGrp="1"/>
+          </p:cNvSpPr>
+          <p:nvPr>
+            <p:ph type="sldNum" sz="quarter" idx="12"/>
+          </p:nvPr>
+        </p:nvSpPr>
+        <p:spPr/>
+        <p:txBody>
+          <a:bodyPr/>
+          <a:lstStyle/>
+          <a:p>
+            <a:fld id="{B6F15528-21DE-4FAA-801E-634DDDAF4B2B}" type="slidenum">
+              <a:rPr lang="en-US" smtClean="0"/>
+              <a:pPr/>
+              <a:t>16</a:t>
             </a:fld>
             <a:endParaRPr lang="en-US" dirty="0"/>
           </a:p>
@@ -14721,7 +15455,7 @@
           <a:graphicData uri="http://schemas.openxmlformats.org/presentationml/2006/ole">
             <mc:AlternateContent xmlns:mc="http://schemas.openxmlformats.org/markup-compatibility/2006">
               <mc:Choice xmlns:v="urn:schemas-microsoft-com:vml" Requires="v">
-                <p:oleObj spid="_x0000_s1089" name="Visio" r:id="rId7" imgW="2485904" imgH="1866757" progId="Visio.Drawing.15">
+                <p:oleObj spid="_x0000_s1094" name="Visio" r:id="rId7" imgW="2485904" imgH="1866757" progId="Visio.Drawing.15">
                   <p:embed/>
                 </p:oleObj>
               </mc:Choice>
@@ -21056,8 +21790,8 @@
           </a:p>
         </p:txBody>
       </p:sp>
-      <mc:AlternateContent xmlns:mc="http://schemas.openxmlformats.org/markup-compatibility/2006">
-        <mc:Choice xmlns:a14="http://schemas.microsoft.com/office/drawing/2010/main" Requires="a14">
+      <mc:AlternateContent xmlns:mc="http://schemas.openxmlformats.org/markup-compatibility/2006" xmlns:a14="http://schemas.microsoft.com/office/drawing/2010/main">
+        <mc:Choice Requires="a14">
           <p:sp>
             <p:nvSpPr>
               <p:cNvPr id="5" name="TextBox 4"/>
@@ -21160,7 +21894,7 @@
             </p:txBody>
           </p:sp>
         </mc:Choice>
-        <mc:Fallback>
+        <mc:Fallback xmlns="">
           <p:sp>
             <p:nvSpPr>
               <p:cNvPr id="5" name="TextBox 4"/>
@@ -21233,10 +21967,6 @@
               </a:rPr>
               <a:t>Shear stress</a:t>
             </a:r>
-            <a:endParaRPr lang="en-US" sz="2000" dirty="0" smtClean="0">
-              <a:latin typeface="Times New Roman" panose="02020603050405020304" pitchFamily="18" charset="0"/>
-              <a:cs typeface="Times New Roman" panose="02020603050405020304" pitchFamily="18" charset="0"/>
-            </a:endParaRPr>
           </a:p>
         </p:txBody>
       </p:sp>

</xml_diff>